<commit_message>
update slides for midterm
</commit_message>
<xml_diff>
--- a/report/midterm.pptx
+++ b/report/midterm.pptx
@@ -242,7 +242,7 @@
           <a:p>
             <a:fld id="{A7B3912A-A208-42D9-A720-8DE28239B8A7}" type="datetimeFigureOut">
               <a:rPr lang="en-US" smtClean="0"/>
-              <a:t>13/8/2014</a:t>
+              <a:t>14/8/2014</a:t>
             </a:fld>
             <a:endParaRPr lang="en-US"/>
           </a:p>
@@ -1034,7 +1034,7 @@
           <a:p>
             <a:fld id="{7FC51BC0-5CD8-4890-A623-D66634BB65F3}" type="datetime1">
               <a:rPr lang="en-US" smtClean="0"/>
-              <a:t>13/8/2014</a:t>
+              <a:t>14/8/2014</a:t>
             </a:fld>
             <a:endParaRPr lang="en-US"/>
           </a:p>
@@ -1372,7 +1372,7 @@
           <a:p>
             <a:fld id="{AE02F185-A3BE-472A-9684-02EC53B78E9C}" type="datetime1">
               <a:rPr lang="en-US" smtClean="0"/>
-              <a:t>13/8/2014</a:t>
+              <a:t>14/8/2014</a:t>
             </a:fld>
             <a:endParaRPr lang="en-US"/>
           </a:p>
@@ -1773,7 +1773,7 @@
           <a:p>
             <a:fld id="{5621C072-7611-44F1-8610-08EC694A07F0}" type="datetime1">
               <a:rPr lang="en-US" smtClean="0"/>
-              <a:t>13/8/2014</a:t>
+              <a:t>14/8/2014</a:t>
             </a:fld>
             <a:endParaRPr lang="en-US"/>
           </a:p>
@@ -2109,7 +2109,7 @@
           <a:p>
             <a:fld id="{6D7964BB-9B41-4DDB-8F12-C699973B51D9}" type="datetime1">
               <a:rPr lang="en-US" smtClean="0"/>
-              <a:t>13/8/2014</a:t>
+              <a:t>14/8/2014</a:t>
             </a:fld>
             <a:endParaRPr lang="en-US"/>
           </a:p>
@@ -2429,7 +2429,7 @@
           <a:p>
             <a:fld id="{32713E24-E9F9-4D7D-AA60-094D056CDCCC}" type="datetime1">
               <a:rPr lang="en-US" smtClean="0"/>
-              <a:t>13/8/2014</a:t>
+              <a:t>14/8/2014</a:t>
             </a:fld>
             <a:endParaRPr lang="en-US"/>
           </a:p>
@@ -2825,7 +2825,7 @@
           <a:p>
             <a:fld id="{E3DDF059-9ED2-4DE0-9CE9-79B3768F8997}" type="datetime1">
               <a:rPr lang="en-US" smtClean="0"/>
-              <a:t>13/8/2014</a:t>
+              <a:t>14/8/2014</a:t>
             </a:fld>
             <a:endParaRPr lang="en-US"/>
           </a:p>
@@ -3082,7 +3082,7 @@
           <a:p>
             <a:fld id="{97ABA458-ED39-4ADA-96F0-D6B8F204BA60}" type="datetime1">
               <a:rPr lang="en-US" smtClean="0"/>
-              <a:t>13/8/2014</a:t>
+              <a:t>14/8/2014</a:t>
             </a:fld>
             <a:endParaRPr lang="en-US"/>
           </a:p>
@@ -3344,7 +3344,7 @@
           <a:p>
             <a:fld id="{08444B18-DB90-41A6-9235-464ECA7F10A4}" type="datetime1">
               <a:rPr lang="en-US" smtClean="0"/>
-              <a:t>13/8/2014</a:t>
+              <a:t>14/8/2014</a:t>
             </a:fld>
             <a:endParaRPr lang="en-US"/>
           </a:p>
@@ -3606,7 +3606,7 @@
           <a:p>
             <a:fld id="{D375DF81-F5DA-44FE-9562-697A179B7B0A}" type="datetime1">
               <a:rPr lang="en-US" smtClean="0"/>
-              <a:t>13/8/2014</a:t>
+              <a:t>14/8/2014</a:t>
             </a:fld>
             <a:endParaRPr lang="en-US"/>
           </a:p>
@@ -3935,7 +3935,7 @@
           <a:p>
             <a:fld id="{574A4FCE-4BC4-48F1-BAFC-21B3F6D1AE28}" type="datetime1">
               <a:rPr lang="en-US" smtClean="0"/>
-              <a:t>13/8/2014</a:t>
+              <a:t>14/8/2014</a:t>
             </a:fld>
             <a:endParaRPr lang="en-US"/>
           </a:p>
@@ -4258,7 +4258,7 @@
           <a:p>
             <a:fld id="{E9A4F337-B4F3-41ED-A235-1EB8E27F4ADC}" type="datetime1">
               <a:rPr lang="en-US" smtClean="0"/>
-              <a:t>13/8/2014</a:t>
+              <a:t>14/8/2014</a:t>
             </a:fld>
             <a:endParaRPr lang="en-US"/>
           </a:p>
@@ -4715,7 +4715,7 @@
           <a:p>
             <a:fld id="{042D7D94-FFAA-495D-AC0F-ABD4E676F73C}" type="datetime1">
               <a:rPr lang="en-US" smtClean="0"/>
-              <a:t>13/8/2014</a:t>
+              <a:t>14/8/2014</a:t>
             </a:fld>
             <a:endParaRPr lang="en-US"/>
           </a:p>
@@ -4920,7 +4920,7 @@
           <a:p>
             <a:fld id="{446193CF-BB28-48CF-8B44-80D6F3490EEE}" type="datetime1">
               <a:rPr lang="en-US" smtClean="0"/>
-              <a:t>13/8/2014</a:t>
+              <a:t>14/8/2014</a:t>
             </a:fld>
             <a:endParaRPr lang="en-US"/>
           </a:p>
@@ -5097,7 +5097,7 @@
           <a:p>
             <a:fld id="{5F7300D2-0E83-4CFE-91DB-6D88FAA3DB5C}" type="datetime1">
               <a:rPr lang="en-US" smtClean="0"/>
-              <a:t>13/8/2014</a:t>
+              <a:t>14/8/2014</a:t>
             </a:fld>
             <a:endParaRPr lang="en-US"/>
           </a:p>
@@ -5430,7 +5430,7 @@
           <a:p>
             <a:fld id="{8CC331A5-A2E0-4093-B454-C6FF04ED1192}" type="datetime1">
               <a:rPr lang="en-US" smtClean="0"/>
-              <a:t>13/8/2014</a:t>
+              <a:t>14/8/2014</a:t>
             </a:fld>
             <a:endParaRPr lang="en-US"/>
           </a:p>
@@ -5775,7 +5775,7 @@
           <a:p>
             <a:fld id="{65369091-B738-4B29-8138-F2365DA6C833}" type="datetime1">
               <a:rPr lang="en-US" smtClean="0"/>
-              <a:t>13/8/2014</a:t>
+              <a:t>14/8/2014</a:t>
             </a:fld>
             <a:endParaRPr lang="en-US"/>
           </a:p>
@@ -7892,7 +7892,7 @@
           <a:p>
             <a:fld id="{0F7C4A8F-7631-40DF-9D95-F8A285B7E60E}" type="datetime1">
               <a:rPr lang="en-US" smtClean="0"/>
-              <a:t>13/8/2014</a:t>
+              <a:t>14/8/2014</a:t>
             </a:fld>
             <a:endParaRPr lang="en-US"/>
           </a:p>
@@ -18564,7 +18564,7 @@
         <p:spPr/>
         <p:txBody>
           <a:bodyPr>
-            <a:normAutofit fontScale="92500"/>
+            <a:normAutofit fontScale="92500" lnSpcReduction="20000"/>
           </a:bodyPr>
           <a:lstStyle/>
           <a:p>
@@ -18573,6 +18573,10 @@
               <a:t>Proof of UNSAT can be used to extract </a:t>
             </a:r>
             <a:r>
+              <a:rPr lang="en-US" sz="2800" dirty="0" smtClean="0"/>
+              <a:t>Craig </a:t>
+            </a:r>
+            <a:r>
               <a:rPr lang="en-US" sz="2800" dirty="0" err="1" smtClean="0"/>
               <a:t>interpolants</a:t>
             </a:r>
@@ -18581,12 +18585,20 @@
           <a:p>
             <a:pPr lvl="1"/>
             <a:r>
-              <a:rPr lang="en-US" sz="2400" dirty="0" err="1" smtClean="0"/>
-              <a:t>Interpolants</a:t>
-            </a:r>
+              <a:rPr lang="en-US" sz="2600" dirty="0" smtClean="0"/>
+              <a:t>Abstraction refinement</a:t>
+            </a:r>
+            <a:endParaRPr lang="en-US" sz="2600" dirty="0" smtClean="0"/>
+          </a:p>
+          <a:p>
+            <a:pPr lvl="1"/>
             <a:r>
               <a:rPr lang="en-US" sz="2400" dirty="0" smtClean="0"/>
-              <a:t> are useful in invariant generation.</a:t>
+              <a:t>Invariant </a:t>
+            </a:r>
+            <a:r>
+              <a:rPr lang="en-US" sz="2400" dirty="0" smtClean="0"/>
+              <a:t>generation.</a:t>
             </a:r>
           </a:p>
           <a:p>
@@ -18725,8 +18737,8 @@
           </a:p>
         </p:txBody>
       </p:sp>
-      <mc:AlternateContent xmlns:mc="http://schemas.openxmlformats.org/markup-compatibility/2006">
-        <mc:Choice xmlns:a14="http://schemas.microsoft.com/office/drawing/2010/main" Requires="a14">
+      <mc:AlternateContent xmlns:mc="http://schemas.openxmlformats.org/markup-compatibility/2006" xmlns:a14="http://schemas.microsoft.com/office/drawing/2010/main">
+        <mc:Choice Requires="a14">
           <p:sp>
             <p:nvSpPr>
               <p:cNvPr id="3" name="Content Placeholder 2"/>
@@ -19439,7 +19451,7 @@
             </p:txBody>
           </p:sp>
         </mc:Choice>
-        <mc:Fallback>
+        <mc:Fallback xmlns="">
           <p:sp>
             <p:nvSpPr>
               <p:cNvPr id="3" name="Content Placeholder 2"/>
@@ -19695,8 +19707,8 @@
           </a:p>
         </p:txBody>
       </p:sp>
-      <mc:AlternateContent xmlns:mc="http://schemas.openxmlformats.org/markup-compatibility/2006">
-        <mc:Choice xmlns:a14="http://schemas.microsoft.com/office/drawing/2010/main" Requires="a14">
+      <mc:AlternateContent xmlns:mc="http://schemas.openxmlformats.org/markup-compatibility/2006" xmlns:a14="http://schemas.microsoft.com/office/drawing/2010/main">
+        <mc:Choice Requires="a14">
           <p:sp>
             <p:nvSpPr>
               <p:cNvPr id="3" name="Content Placeholder 2"/>
@@ -20621,7 +20633,7 @@
             </p:txBody>
           </p:sp>
         </mc:Choice>
-        <mc:Fallback>
+        <mc:Fallback xmlns="">
           <p:sp>
             <p:nvSpPr>
               <p:cNvPr id="3" name="Content Placeholder 2"/>
@@ -20730,8 +20742,8 @@
           </a:p>
         </p:txBody>
       </p:sp>
-      <mc:AlternateContent xmlns:mc="http://schemas.openxmlformats.org/markup-compatibility/2006">
-        <mc:Choice xmlns:a14="http://schemas.microsoft.com/office/drawing/2010/main" Requires="a14">
+      <mc:AlternateContent xmlns:mc="http://schemas.openxmlformats.org/markup-compatibility/2006" xmlns:a14="http://schemas.microsoft.com/office/drawing/2010/main">
+        <mc:Choice Requires="a14">
           <p:sp>
             <p:nvSpPr>
               <p:cNvPr id="3" name="Content Placeholder 2"/>
@@ -21597,7 +21609,7 @@
             </p:txBody>
           </p:sp>
         </mc:Choice>
-        <mc:Fallback>
+        <mc:Fallback xmlns="">
           <p:sp>
             <p:nvSpPr>
               <p:cNvPr id="3" name="Content Placeholder 2"/>
@@ -22682,19 +22694,7 @@
                 <a:pPr lvl="1"/>
                 <a:r>
                   <a:rPr lang="en-US" dirty="0" smtClean="0"/>
-                  <a:t>Theory solver </a:t>
-                </a:r>
-                <a:r>
-                  <a:rPr lang="en-US" dirty="0" smtClean="0"/>
-                  <a:t>detects </a:t>
-                </a:r>
-                <a:r>
-                  <a:rPr lang="en-US" dirty="0" smtClean="0"/>
-                  <a:t>a </a:t>
-                </a:r>
-                <a:r>
-                  <a:rPr lang="en-US" dirty="0" smtClean="0"/>
-                  <a:t>conflict</a:t>
+                  <a:t>Theory solver detects a conflict</a:t>
                 </a:r>
                 <a:r>
                   <a:rPr lang="en-US" dirty="0"/>
@@ -22702,11 +22702,7 @@
                 </a:r>
                 <a:r>
                   <a:rPr lang="en-US" dirty="0" smtClean="0"/>
-                  <a:t>and</a:t>
-                </a:r>
-                <a:r>
-                  <a:rPr lang="en-US" dirty="0" smtClean="0"/>
-                  <a:t> generate UNSAT proof, </a:t>
+                  <a:t>and generate UNSAT proof, </a:t>
                 </a:r>
                 <a:r>
                   <a:rPr lang="en-US" dirty="0" err="1" smtClean="0"/>
@@ -22716,7 +22712,6 @@
                   <a:rPr lang="en-US" dirty="0" smtClean="0"/>
                   <a:t>.</a:t>
                 </a:r>
-                <a:endParaRPr lang="en-US" dirty="0" smtClean="0"/>
               </a:p>
               <a:p>
                 <a:pPr lvl="1"/>
@@ -22893,11 +22888,105 @@
         </p:blipFill>
         <p:spPr>
           <a:xfrm>
-            <a:off x="531812" y="2044700"/>
+            <a:off x="1256745" y="2044700"/>
             <a:ext cx="6819469" cy="3778250"/>
           </a:xfrm>
         </p:spPr>
       </p:pic>
+      <p:pic>
+        <p:nvPicPr>
+          <p:cNvPr id="5" name="Picture 4"/>
+          <p:cNvPicPr>
+            <a:picLocks noChangeAspect="1"/>
+          </p:cNvPicPr>
+          <p:nvPr/>
+        </p:nvPicPr>
+        <p:blipFill>
+          <a:blip r:embed="rId3">
+            <a:extLst>
+              <a:ext uri="{28A0092B-C50C-407E-A947-70E740481C1C}">
+                <a14:useLocalDpi xmlns:a14="http://schemas.microsoft.com/office/drawing/2010/main" val="0"/>
+              </a:ext>
+            </a:extLst>
+          </a:blip>
+          <a:stretch>
+            <a:fillRect/>
+          </a:stretch>
+        </p:blipFill>
+        <p:spPr>
+          <a:xfrm>
+            <a:off x="7258750" y="2141838"/>
+            <a:ext cx="3998183" cy="3681112"/>
+          </a:xfrm>
+          <a:prstGeom prst="rect">
+            <a:avLst/>
+          </a:prstGeom>
+        </p:spPr>
+      </p:pic>
+      <p:sp>
+        <p:nvSpPr>
+          <p:cNvPr id="6" name="TextBox 5"/>
+          <p:cNvSpPr txBox="1"/>
+          <p:nvPr/>
+        </p:nvSpPr>
+        <p:spPr>
+          <a:xfrm>
+            <a:off x="2949146" y="5955957"/>
+            <a:ext cx="1962397" cy="369332"/>
+          </a:xfrm>
+          <a:prstGeom prst="rect">
+            <a:avLst/>
+          </a:prstGeom>
+          <a:noFill/>
+        </p:spPr>
+        <p:txBody>
+          <a:bodyPr wrap="none" rtlCol="0">
+            <a:spAutoFit/>
+          </a:bodyPr>
+          <a:lstStyle/>
+          <a:p>
+            <a:r>
+              <a:rPr lang="en-US" dirty="0" smtClean="0"/>
+              <a:t>Resolution Proof</a:t>
+            </a:r>
+            <a:endParaRPr lang="en-US" dirty="0"/>
+          </a:p>
+        </p:txBody>
+      </p:sp>
+      <p:sp>
+        <p:nvSpPr>
+          <p:cNvPr id="8" name="TextBox 7"/>
+          <p:cNvSpPr txBox="1"/>
+          <p:nvPr/>
+        </p:nvSpPr>
+        <p:spPr>
+          <a:xfrm>
+            <a:off x="8076214" y="6059788"/>
+            <a:ext cx="2632452" cy="369332"/>
+          </a:xfrm>
+          <a:prstGeom prst="rect">
+            <a:avLst/>
+          </a:prstGeom>
+          <a:noFill/>
+        </p:spPr>
+        <p:txBody>
+          <a:bodyPr wrap="none" rtlCol="0">
+            <a:spAutoFit/>
+          </a:bodyPr>
+          <a:lstStyle/>
+          <a:p>
+            <a:r>
+              <a:rPr lang="en-US" dirty="0" err="1" smtClean="0"/>
+              <a:t>Interpolants</a:t>
+            </a:r>
+            <a:r>
+              <a:rPr lang="en-US" dirty="0" smtClean="0"/>
+              <a:t> inference</a:t>
+            </a:r>
+            <a:endParaRPr lang="en-US" dirty="0"/>
+          </a:p>
+        </p:txBody>
+      </p:sp>
     </p:spTree>
     <p:extLst>
       <p:ext uri="{BB962C8B-B14F-4D97-AF65-F5344CB8AC3E}">

</xml_diff>

<commit_message>
change in mid-term presentation
</commit_message>
<xml_diff>
--- a/report/midterm.pptx
+++ b/report/midterm.pptx
@@ -5,7 +5,7 @@
     <p:sldMasterId id="2147483861" r:id="rId1"/>
   </p:sldMasterIdLst>
   <p:notesMasterIdLst>
-    <p:notesMasterId r:id="rId36"/>
+    <p:notesMasterId r:id="rId37"/>
   </p:notesMasterIdLst>
   <p:sldIdLst>
     <p:sldId id="256" r:id="rId2"/>
@@ -41,7 +41,8 @@
     <p:sldId id="325" r:id="rId32"/>
     <p:sldId id="326" r:id="rId33"/>
     <p:sldId id="327" r:id="rId34"/>
-    <p:sldId id="297" r:id="rId35"/>
+    <p:sldId id="328" r:id="rId35"/>
+    <p:sldId id="297" r:id="rId36"/>
   </p:sldIdLst>
   <p:sldSz cx="12192000" cy="6858000"/>
   <p:notesSz cx="6858000" cy="9144000"/>
@@ -23032,6 +23033,138 @@
           <a:bodyPr/>
           <a:lstStyle/>
           <a:p>
+            <a:r>
+              <a:rPr lang="en-US" dirty="0" smtClean="0"/>
+              <a:t>Primary idea</a:t>
+            </a:r>
+            <a:endParaRPr lang="en-US" dirty="0"/>
+          </a:p>
+        </p:txBody>
+      </p:sp>
+      <p:sp>
+        <p:nvSpPr>
+          <p:cNvPr id="3" name="Content Placeholder 2"/>
+          <p:cNvSpPr>
+            <a:spLocks noGrp="1"/>
+          </p:cNvSpPr>
+          <p:nvPr>
+            <p:ph idx="1"/>
+          </p:nvPr>
+        </p:nvSpPr>
+        <p:spPr/>
+        <p:txBody>
+          <a:bodyPr/>
+          <a:lstStyle/>
+          <a:p>
+            <a:r>
+              <a:rPr lang="en-US" dirty="0" err="1" smtClean="0"/>
+              <a:t>Interpolant</a:t>
+            </a:r>
+            <a:r>
+              <a:rPr lang="en-US" dirty="0" smtClean="0"/>
+              <a:t> inference from resolution proof is similar to MATHSAT.</a:t>
+            </a:r>
+          </a:p>
+          <a:p>
+            <a:r>
+              <a:rPr lang="en-US" dirty="0" smtClean="0"/>
+              <a:t>Difference in inferring </a:t>
+            </a:r>
+            <a:r>
+              <a:rPr lang="en-US" dirty="0" err="1" smtClean="0"/>
+              <a:t>interpolants</a:t>
+            </a:r>
+            <a:r>
+              <a:rPr lang="en-US" dirty="0" smtClean="0"/>
+              <a:t> of conflicts:</a:t>
+            </a:r>
+          </a:p>
+          <a:p>
+            <a:pPr lvl="1"/>
+            <a:r>
+              <a:rPr lang="en-US" dirty="0" err="1" smtClean="0"/>
+              <a:t>raSAT</a:t>
+            </a:r>
+            <a:r>
+              <a:rPr lang="en-US" dirty="0" smtClean="0"/>
+              <a:t> use IA </a:t>
+            </a:r>
+            <a:r>
+              <a:rPr lang="en-US" smtClean="0"/>
+              <a:t>for proving UNSAT.</a:t>
+            </a:r>
+            <a:endParaRPr lang="en-US" dirty="0"/>
+          </a:p>
+        </p:txBody>
+      </p:sp>
+      <p:sp>
+        <p:nvSpPr>
+          <p:cNvPr id="4" name="Slide Number Placeholder 3"/>
+          <p:cNvSpPr>
+            <a:spLocks noGrp="1"/>
+          </p:cNvSpPr>
+          <p:nvPr>
+            <p:ph type="sldNum" sz="quarter" idx="12"/>
+          </p:nvPr>
+        </p:nvSpPr>
+        <p:spPr/>
+        <p:txBody>
+          <a:bodyPr/>
+          <a:lstStyle/>
+          <a:p>
+            <a:fld id="{9A0678A6-D03C-427C-87B3-2EDFDC71965B}" type="slidenum">
+              <a:rPr lang="en-US" smtClean="0"/>
+              <a:t>34</a:t>
+            </a:fld>
+            <a:endParaRPr lang="en-US"/>
+          </a:p>
+        </p:txBody>
+      </p:sp>
+    </p:spTree>
+    <p:extLst>
+      <p:ext uri="{BB962C8B-B14F-4D97-AF65-F5344CB8AC3E}">
+        <p14:creationId xmlns:p14="http://schemas.microsoft.com/office/powerpoint/2010/main" val="3951020123"/>
+      </p:ext>
+    </p:extLst>
+  </p:cSld>
+  <p:clrMapOvr>
+    <a:masterClrMapping/>
+  </p:clrMapOvr>
+</p:sld>
+</file>
+
+<file path=ppt/slides/slide35.xml><?xml version="1.0" encoding="utf-8"?>
+<p:sld xmlns:a="http://schemas.openxmlformats.org/drawingml/2006/main" xmlns:r="http://schemas.openxmlformats.org/officeDocument/2006/relationships" xmlns:p="http://schemas.openxmlformats.org/presentationml/2006/main">
+  <p:cSld>
+    <p:spTree>
+      <p:nvGrpSpPr>
+        <p:cNvPr id="1" name=""/>
+        <p:cNvGrpSpPr/>
+        <p:nvPr/>
+      </p:nvGrpSpPr>
+      <p:grpSpPr>
+        <a:xfrm>
+          <a:off x="0" y="0"/>
+          <a:ext cx="0" cy="0"/>
+          <a:chOff x="0" y="0"/>
+          <a:chExt cx="0" cy="0"/>
+        </a:xfrm>
+      </p:grpSpPr>
+      <p:sp>
+        <p:nvSpPr>
+          <p:cNvPr id="2" name="Title 1"/>
+          <p:cNvSpPr>
+            <a:spLocks noGrp="1"/>
+          </p:cNvSpPr>
+          <p:nvPr>
+            <p:ph type="title"/>
+          </p:nvPr>
+        </p:nvSpPr>
+        <p:spPr/>
+        <p:txBody>
+          <a:bodyPr/>
+          <a:lstStyle/>
+          <a:p>
             <a:endParaRPr lang="en-US"/>
           </a:p>
         </p:txBody>
@@ -23149,7 +23282,7 @@
           <a:p>
             <a:fld id="{9A0678A6-D03C-427C-87B3-2EDFDC71965B}" type="slidenum">
               <a:rPr lang="en-US" smtClean="0"/>
-              <a:t>34</a:t>
+              <a:t>35</a:t>
             </a:fld>
             <a:endParaRPr lang="en-US"/>
           </a:p>

</xml_diff>

<commit_message>
modify slides for mid-term
</commit_message>
<xml_diff>
--- a/report/midterm.pptx
+++ b/report/midterm.pptx
@@ -240,7 +240,7 @@
           <a:p>
             <a:fld id="{A7B3912A-A208-42D9-A720-8DE28239B8A7}" type="datetimeFigureOut">
               <a:rPr lang="en-US" smtClean="0"/>
-              <a:t>17/8/2014</a:t>
+              <a:t>18/8/2014</a:t>
             </a:fld>
             <a:endParaRPr lang="en-US"/>
           </a:p>
@@ -948,7 +948,7 @@
           <a:p>
             <a:fld id="{7FC51BC0-5CD8-4890-A623-D66634BB65F3}" type="datetime1">
               <a:rPr lang="en-US" smtClean="0"/>
-              <a:t>17/8/2014</a:t>
+              <a:t>18/8/2014</a:t>
             </a:fld>
             <a:endParaRPr lang="en-US"/>
           </a:p>
@@ -1286,7 +1286,7 @@
           <a:p>
             <a:fld id="{AE02F185-A3BE-472A-9684-02EC53B78E9C}" type="datetime1">
               <a:rPr lang="en-US" smtClean="0"/>
-              <a:t>17/8/2014</a:t>
+              <a:t>18/8/2014</a:t>
             </a:fld>
             <a:endParaRPr lang="en-US"/>
           </a:p>
@@ -1687,7 +1687,7 @@
           <a:p>
             <a:fld id="{5621C072-7611-44F1-8610-08EC694A07F0}" type="datetime1">
               <a:rPr lang="en-US" smtClean="0"/>
-              <a:t>17/8/2014</a:t>
+              <a:t>18/8/2014</a:t>
             </a:fld>
             <a:endParaRPr lang="en-US"/>
           </a:p>
@@ -2023,7 +2023,7 @@
           <a:p>
             <a:fld id="{6D7964BB-9B41-4DDB-8F12-C699973B51D9}" type="datetime1">
               <a:rPr lang="en-US" smtClean="0"/>
-              <a:t>17/8/2014</a:t>
+              <a:t>18/8/2014</a:t>
             </a:fld>
             <a:endParaRPr lang="en-US"/>
           </a:p>
@@ -2343,7 +2343,7 @@
           <a:p>
             <a:fld id="{32713E24-E9F9-4D7D-AA60-094D056CDCCC}" type="datetime1">
               <a:rPr lang="en-US" smtClean="0"/>
-              <a:t>17/8/2014</a:t>
+              <a:t>18/8/2014</a:t>
             </a:fld>
             <a:endParaRPr lang="en-US"/>
           </a:p>
@@ -2739,7 +2739,7 @@
           <a:p>
             <a:fld id="{E3DDF059-9ED2-4DE0-9CE9-79B3768F8997}" type="datetime1">
               <a:rPr lang="en-US" smtClean="0"/>
-              <a:t>17/8/2014</a:t>
+              <a:t>18/8/2014</a:t>
             </a:fld>
             <a:endParaRPr lang="en-US"/>
           </a:p>
@@ -2996,7 +2996,7 @@
           <a:p>
             <a:fld id="{97ABA458-ED39-4ADA-96F0-D6B8F204BA60}" type="datetime1">
               <a:rPr lang="en-US" smtClean="0"/>
-              <a:t>17/8/2014</a:t>
+              <a:t>18/8/2014</a:t>
             </a:fld>
             <a:endParaRPr lang="en-US"/>
           </a:p>
@@ -3258,7 +3258,7 @@
           <a:p>
             <a:fld id="{08444B18-DB90-41A6-9235-464ECA7F10A4}" type="datetime1">
               <a:rPr lang="en-US" smtClean="0"/>
-              <a:t>17/8/2014</a:t>
+              <a:t>18/8/2014</a:t>
             </a:fld>
             <a:endParaRPr lang="en-US"/>
           </a:p>
@@ -3520,7 +3520,7 @@
           <a:p>
             <a:fld id="{D375DF81-F5DA-44FE-9562-697A179B7B0A}" type="datetime1">
               <a:rPr lang="en-US" smtClean="0"/>
-              <a:t>17/8/2014</a:t>
+              <a:t>18/8/2014</a:t>
             </a:fld>
             <a:endParaRPr lang="en-US"/>
           </a:p>
@@ -3849,7 +3849,7 @@
           <a:p>
             <a:fld id="{574A4FCE-4BC4-48F1-BAFC-21B3F6D1AE28}" type="datetime1">
               <a:rPr lang="en-US" smtClean="0"/>
-              <a:t>17/8/2014</a:t>
+              <a:t>18/8/2014</a:t>
             </a:fld>
             <a:endParaRPr lang="en-US"/>
           </a:p>
@@ -4172,7 +4172,7 @@
           <a:p>
             <a:fld id="{E9A4F337-B4F3-41ED-A235-1EB8E27F4ADC}" type="datetime1">
               <a:rPr lang="en-US" smtClean="0"/>
-              <a:t>17/8/2014</a:t>
+              <a:t>18/8/2014</a:t>
             </a:fld>
             <a:endParaRPr lang="en-US"/>
           </a:p>
@@ -4629,7 +4629,7 @@
           <a:p>
             <a:fld id="{042D7D94-FFAA-495D-AC0F-ABD4E676F73C}" type="datetime1">
               <a:rPr lang="en-US" smtClean="0"/>
-              <a:t>17/8/2014</a:t>
+              <a:t>18/8/2014</a:t>
             </a:fld>
             <a:endParaRPr lang="en-US"/>
           </a:p>
@@ -4834,7 +4834,7 @@
           <a:p>
             <a:fld id="{446193CF-BB28-48CF-8B44-80D6F3490EEE}" type="datetime1">
               <a:rPr lang="en-US" smtClean="0"/>
-              <a:t>17/8/2014</a:t>
+              <a:t>18/8/2014</a:t>
             </a:fld>
             <a:endParaRPr lang="en-US"/>
           </a:p>
@@ -5011,7 +5011,7 @@
           <a:p>
             <a:fld id="{5F7300D2-0E83-4CFE-91DB-6D88FAA3DB5C}" type="datetime1">
               <a:rPr lang="en-US" smtClean="0"/>
-              <a:t>17/8/2014</a:t>
+              <a:t>18/8/2014</a:t>
             </a:fld>
             <a:endParaRPr lang="en-US"/>
           </a:p>
@@ -5344,7 +5344,7 @@
           <a:p>
             <a:fld id="{8CC331A5-A2E0-4093-B454-C6FF04ED1192}" type="datetime1">
               <a:rPr lang="en-US" smtClean="0"/>
-              <a:t>17/8/2014</a:t>
+              <a:t>18/8/2014</a:t>
             </a:fld>
             <a:endParaRPr lang="en-US"/>
           </a:p>
@@ -5689,7 +5689,7 @@
           <a:p>
             <a:fld id="{65369091-B738-4B29-8138-F2365DA6C833}" type="datetime1">
               <a:rPr lang="en-US" smtClean="0"/>
-              <a:t>17/8/2014</a:t>
+              <a:t>18/8/2014</a:t>
             </a:fld>
             <a:endParaRPr lang="en-US"/>
           </a:p>
@@ -7806,7 +7806,7 @@
           <a:p>
             <a:fld id="{0F7C4A8F-7631-40DF-9D95-F8A285B7E60E}" type="datetime1">
               <a:rPr lang="en-US" smtClean="0"/>
-              <a:t>17/8/2014</a:t>
+              <a:t>18/8/2014</a:t>
             </a:fld>
             <a:endParaRPr lang="en-US"/>
           </a:p>
@@ -8804,22 +8804,14 @@
             </a:pPr>
             <a:r>
               <a:rPr lang="en-US" sz="2400" dirty="0" smtClean="0"/>
-              <a:t>Testing phase</a:t>
-            </a:r>
-            <a:r>
-              <a:rPr lang="en-US" sz="2400" dirty="0" smtClean="0"/>
-              <a:t>. </a:t>
+              <a:t>Testing phase. </a:t>
             </a:r>
           </a:p>
           <a:p>
             <a:pPr marL="857250" lvl="1" indent="-457200"/>
             <a:r>
               <a:rPr lang="en-US" sz="2200" dirty="0" smtClean="0"/>
-              <a:t>Testing </a:t>
-            </a:r>
-            <a:r>
-              <a:rPr lang="en-US" sz="2200" dirty="0" smtClean="0"/>
-              <a:t>consumes </a:t>
+              <a:t>Testing consumes </a:t>
             </a:r>
             <a:r>
               <a:rPr lang="en-US" sz="2200" smtClean="0"/>
@@ -8919,8 +8911,8 @@
           </a:p>
         </p:txBody>
       </p:sp>
-      <mc:AlternateContent xmlns:mc="http://schemas.openxmlformats.org/markup-compatibility/2006">
-        <mc:Choice xmlns:a14="http://schemas.microsoft.com/office/drawing/2010/main" Requires="a14">
+      <mc:AlternateContent xmlns:mc="http://schemas.openxmlformats.org/markup-compatibility/2006" xmlns:a14="http://schemas.microsoft.com/office/drawing/2010/main">
+        <mc:Choice Requires="a14">
           <p:sp>
             <p:nvSpPr>
               <p:cNvPr id="3" name="Content Placeholder 2"/>
@@ -9132,7 +9124,7 @@
             </p:txBody>
           </p:sp>
         </mc:Choice>
-        <mc:Fallback>
+        <mc:Fallback xmlns="">
           <p:sp>
             <p:nvSpPr>
               <p:cNvPr id="3" name="Content Placeholder 2"/>
@@ -9880,11 +9872,7 @@
             <a:pPr lvl="1"/>
             <a:r>
               <a:rPr lang="en-US" sz="2400" dirty="0" smtClean="0"/>
-              <a:t>Subset of variables</a:t>
-            </a:r>
-            <a:r>
-              <a:rPr lang="en-US" sz="2400" dirty="0" smtClean="0"/>
-              <a:t>: new idea, implemented in </a:t>
+              <a:t>Subset of variables: new idea, implemented in </a:t>
             </a:r>
             <a:r>
               <a:rPr lang="en-US" sz="2400" dirty="0" err="1" smtClean="0"/>
@@ -10282,11 +10270,7 @@
           <a:p>
             <a:r>
               <a:rPr lang="en-US" sz="2800" dirty="0" smtClean="0"/>
-              <a:t>Testing </a:t>
-            </a:r>
-            <a:r>
-              <a:rPr lang="en-US" sz="2800" dirty="0" smtClean="0"/>
-              <a:t>time is quite high, memory consuming: </a:t>
+              <a:t>Testing time is quite high, memory consuming: </a:t>
             </a:r>
             <a:endParaRPr lang="en-US" sz="2400" dirty="0" smtClean="0"/>
           </a:p>
@@ -10296,11 +10280,7 @@
             </a:pPr>
             <a:r>
               <a:rPr lang="en-US" sz="2400" dirty="0" smtClean="0"/>
-              <a:t>Limit </a:t>
-            </a:r>
-            <a:r>
-              <a:rPr lang="en-US" sz="2400" dirty="0" smtClean="0"/>
-              <a:t>test cases to a fixed number:</a:t>
+              <a:t>Limit test cases to a fixed number:</a:t>
             </a:r>
           </a:p>
           <a:p>
@@ -10708,11 +10688,7 @@
           <a:p>
             <a:r>
               <a:rPr lang="en-US" sz="2800" dirty="0" smtClean="0"/>
-              <a:t>Not </a:t>
-            </a:r>
-            <a:r>
-              <a:rPr lang="en-US" sz="2800" dirty="0" smtClean="0"/>
-              <a:t>much improvements in solved problems</a:t>
+              <a:t>Not much improvements in solved problems</a:t>
             </a:r>
           </a:p>
           <a:p>
@@ -11966,8 +11942,8 @@
           </a:p>
         </p:txBody>
       </p:sp>
-      <mc:AlternateContent xmlns:mc="http://schemas.openxmlformats.org/markup-compatibility/2006">
-        <mc:Choice xmlns:a14="http://schemas.microsoft.com/office/drawing/2010/main" Requires="a14">
+      <mc:AlternateContent xmlns:mc="http://schemas.openxmlformats.org/markup-compatibility/2006" xmlns:a14="http://schemas.microsoft.com/office/drawing/2010/main">
+        <mc:Choice Requires="a14">
           <p:sp>
             <p:nvSpPr>
               <p:cNvPr id="3" name="Content Placeholder 2"/>
@@ -12117,7 +12093,7 @@
             </p:txBody>
           </p:sp>
         </mc:Choice>
-        <mc:Fallback>
+        <mc:Fallback xmlns="">
           <p:sp>
             <p:nvSpPr>
               <p:cNvPr id="3" name="Content Placeholder 2"/>
@@ -13090,11 +13066,7 @@
             </a:pPr>
             <a:r>
               <a:rPr lang="en-US" sz="3600" dirty="0" smtClean="0"/>
-              <a:t>Problems</a:t>
-            </a:r>
-            <a:r>
-              <a:rPr lang="en-US" sz="3600" dirty="0" smtClean="0"/>
-              <a:t>.</a:t>
+              <a:t>Problems.</a:t>
             </a:r>
           </a:p>
           <a:p>
@@ -15164,13 +15136,8 @@
             </a:r>
             <a:r>
               <a:rPr lang="en-US" sz="2600" dirty="0" smtClean="0"/>
-              <a:t> basis</a:t>
-            </a:r>
-            <a:r>
-              <a:rPr lang="en-US" sz="2600" dirty="0" smtClean="0"/>
-              <a:t>.</a:t>
-            </a:r>
-            <a:endParaRPr lang="en-US" sz="2600" dirty="0" smtClean="0"/>
+              <a:t> basis.</a:t>
+            </a:r>
           </a:p>
         </p:txBody>
       </p:sp>
@@ -15272,8 +15239,8 @@
           </a:p>
         </p:txBody>
       </p:sp>
-      <mc:AlternateContent xmlns:mc="http://schemas.openxmlformats.org/markup-compatibility/2006">
-        <mc:Choice xmlns:a14="http://schemas.microsoft.com/office/drawing/2010/main" Requires="a14">
+      <mc:AlternateContent xmlns:mc="http://schemas.openxmlformats.org/markup-compatibility/2006" xmlns:a14="http://schemas.microsoft.com/office/drawing/2010/main">
+        <mc:Choice Requires="a14">
           <p:sp>
             <p:nvSpPr>
               <p:cNvPr id="3" name="Content Placeholder 2"/>
@@ -15572,18 +15539,13 @@
               <a:p>
                 <a:r>
                   <a:rPr lang="en-US" sz="2400" dirty="0" smtClean="0"/>
-                  <a:t>For efficient AC rewriting system, we will use Maude</a:t>
+                  <a:t>For efficient AC rewriting system, we will use Maude.</a:t>
                 </a:r>
-                <a:r>
-                  <a:rPr lang="en-US" sz="2400" dirty="0" smtClean="0"/>
-                  <a:t>.</a:t>
-                </a:r>
-                <a:endParaRPr lang="en-US" sz="2400" dirty="0" smtClean="0"/>
               </a:p>
             </p:txBody>
           </p:sp>
         </mc:Choice>
-        <mc:Fallback>
+        <mc:Fallback xmlns="">
           <p:sp>
             <p:nvSpPr>
               <p:cNvPr id="3" name="Content Placeholder 2"/>
@@ -16529,19 +16491,7 @@
               <a:rPr lang="en-US" sz="2400" b="0" dirty="0" smtClean="0">
                 <a:ea typeface="Cambria Math" panose="02040503050406030204" pitchFamily="18" charset="0"/>
               </a:rPr>
-              <a:t> </a:t>
-            </a:r>
-            <a:r>
-              <a:rPr lang="en-US" sz="2400" b="0" dirty="0" smtClean="0">
-                <a:ea typeface="Cambria Math" panose="02040503050406030204" pitchFamily="18" charset="0"/>
-              </a:rPr>
-              <a:t>are extracted from the above proofs</a:t>
-            </a:r>
-            <a:r>
-              <a:rPr lang="en-US" sz="2400" b="0" dirty="0" smtClean="0">
-                <a:ea typeface="Cambria Math" panose="02040503050406030204" pitchFamily="18" charset="0"/>
-              </a:rPr>
-              <a:t>.</a:t>
+              <a:t> are extracted from the above proofs.</a:t>
             </a:r>
           </a:p>
           <a:p>
@@ -18116,13 +18066,8 @@
           <a:p>
             <a:r>
               <a:rPr lang="en-US" altLang="ja-JP" sz="3200" dirty="0" smtClean="0"/>
-              <a:t>SMT problem is a decision </a:t>
-            </a:r>
-            <a:r>
-              <a:rPr lang="en-US" altLang="ja-JP" sz="3200" dirty="0" smtClean="0"/>
-              <a:t>problem</a:t>
-            </a:r>
-            <a:endParaRPr lang="en-US" altLang="ja-JP" sz="3200" dirty="0" smtClean="0"/>
+              <a:t>SMT problem is a decision problem</a:t>
+            </a:r>
           </a:p>
           <a:p>
             <a:pPr lvl="1"/>
@@ -18894,8 +18839,8 @@
           </a:p>
         </p:txBody>
       </p:sp>
-      <mc:AlternateContent xmlns:mc="http://schemas.openxmlformats.org/markup-compatibility/2006">
-        <mc:Choice xmlns:a14="http://schemas.microsoft.com/office/drawing/2010/main" Requires="a14">
+      <mc:AlternateContent xmlns:mc="http://schemas.openxmlformats.org/markup-compatibility/2006" xmlns:a14="http://schemas.microsoft.com/office/drawing/2010/main">
+        <mc:Choice Requires="a14">
           <p:sp>
             <p:nvSpPr>
               <p:cNvPr id="3" name="Content Placeholder 2"/>
@@ -18950,7 +18895,6 @@
                   <a:rPr lang="en-US" sz="2400" dirty="0" smtClean="0"/>
                   <a:t>Methods:</a:t>
                 </a:r>
-                <a:endParaRPr lang="en-US" sz="2400" dirty="0" smtClean="0"/>
               </a:p>
               <a:p>
                 <a:pPr lvl="1"/>
@@ -19030,7 +18974,7 @@
             </p:txBody>
           </p:sp>
         </mc:Choice>
-        <mc:Fallback>
+        <mc:Fallback xmlns="">
           <p:sp>
             <p:nvSpPr>
               <p:cNvPr id="3" name="Content Placeholder 2"/>
@@ -19690,11 +19634,15 @@
                 <a:pPr lvl="1"/>
                 <a:r>
                   <a:rPr lang="en-US" sz="2400" dirty="0"/>
-                  <a:t>t</a:t>
+                  <a:t>T</a:t>
                 </a:r>
                 <a:r>
                   <a:rPr lang="en-US" sz="2400" dirty="0" smtClean="0"/>
-                  <a:t>here is some rational numbers </a:t>
+                  <a:t>here </a:t>
+                </a:r>
+                <a:r>
+                  <a:rPr lang="en-US" sz="2400" dirty="0" smtClean="0"/>
+                  <a:t>is some rational numbers </a:t>
                 </a:r>
                 <a14:m>
                   <m:oMath xmlns:m="http://schemas.openxmlformats.org/officeDocument/2006/math">
@@ -19760,59 +19708,76 @@
                 </a14:m>
                 <a:r>
                   <a:rPr lang="en-US" sz="2400" dirty="0" smtClean="0"/>
-                  <a:t> in which </a:t>
+                  <a:t> in </a:t>
                 </a:r>
+                <a:r>
+                  <a:rPr lang="en-US" sz="2400" dirty="0" smtClean="0"/>
+                  <a:t>which</a:t>
+                </a:r>
+                <a:endParaRPr lang="en-US" sz="2000" i="1" dirty="0" smtClean="0">
+                  <a:latin typeface="Cambria Math" panose="02040503050406030204" pitchFamily="18" charset="0"/>
+                </a:endParaRPr>
+              </a:p>
+              <a:p>
+                <a:pPr marL="457200" lvl="1" indent="0">
+                  <a:buNone/>
+                </a:pPr>
                 <a14:m>
-                  <m:oMath xmlns:m="http://schemas.openxmlformats.org/officeDocument/2006/math">
-                    <m:r>
-                      <a:rPr lang="en-US" sz="2000" i="1">
-                        <a:latin typeface="Cambria Math" panose="02040503050406030204" pitchFamily="18" charset="0"/>
-                      </a:rPr>
-                      <m:t>𝑓</m:t>
-                    </m:r>
-                    <m:d>
-                      <m:dPr>
-                        <m:ctrlPr>
-                          <a:rPr lang="en-US" sz="2000" i="1">
-                            <a:latin typeface="Cambria Math" panose="02040503050406030204" pitchFamily="18" charset="0"/>
-                          </a:rPr>
-                        </m:ctrlPr>
-                      </m:dPr>
-                      <m:e>
-                        <m:sSub>
-                          <m:sSubPr>
-                            <m:ctrlPr>
-                              <a:rPr lang="en-US" sz="2400" i="1">
-                                <a:latin typeface="Cambria Math" panose="02040503050406030204" pitchFamily="18" charset="0"/>
-                              </a:rPr>
-                            </m:ctrlPr>
-                          </m:sSubPr>
-                          <m:e>
-                            <m:r>
-                              <a:rPr lang="en-US" sz="2400" i="1">
-                                <a:latin typeface="Cambria Math" panose="02040503050406030204" pitchFamily="18" charset="0"/>
-                              </a:rPr>
-                              <m:t>𝑥</m:t>
-                            </m:r>
-                          </m:e>
-                          <m:sub>
-                            <m:r>
-                              <a:rPr lang="en-US" sz="2400" b="0" i="1" smtClean="0">
-                                <a:latin typeface="Cambria Math" panose="02040503050406030204" pitchFamily="18" charset="0"/>
-                              </a:rPr>
-                              <m:t>1</m:t>
-                            </m:r>
-                          </m:sub>
-                        </m:sSub>
-                      </m:e>
-                    </m:d>
-                    <m:r>
-                      <a:rPr lang="en-US" sz="2000" i="1">
-                        <a:latin typeface="Cambria Math" panose="02040503050406030204" pitchFamily="18" charset="0"/>
-                      </a:rPr>
-                      <m:t>&gt;0</m:t>
-                    </m:r>
-                  </m:oMath>
+                  <m:oMathPara xmlns:m="http://schemas.openxmlformats.org/officeDocument/2006/math">
+                    <m:oMathParaPr>
+                      <m:jc m:val="left"/>
+                    </m:oMathParaPr>
+                    <m:oMath xmlns:m="http://schemas.openxmlformats.org/officeDocument/2006/math">
+                      <m:r>
+                        <a:rPr lang="en-US" sz="2000" i="1">
+                          <a:latin typeface="Cambria Math" panose="02040503050406030204" pitchFamily="18" charset="0"/>
+                        </a:rPr>
+                        <m:t>𝑓</m:t>
+                      </m:r>
+                      <m:d>
+                        <m:dPr>
+                          <m:ctrlPr>
+                            <a:rPr lang="en-US" sz="2000" i="1">
+                              <a:latin typeface="Cambria Math" panose="02040503050406030204" pitchFamily="18" charset="0"/>
+                            </a:rPr>
+                          </m:ctrlPr>
+                        </m:dPr>
+                        <m:e>
+                          <m:sSub>
+                            <m:sSubPr>
+                              <m:ctrlPr>
+                                <a:rPr lang="en-US" sz="2400" i="1">
+                                  <a:latin typeface="Cambria Math" panose="02040503050406030204" pitchFamily="18" charset="0"/>
+                                </a:rPr>
+                              </m:ctrlPr>
+                            </m:sSubPr>
+                            <m:e>
+                              <m:r>
+                                <a:rPr lang="en-US" sz="2400" i="1">
+                                  <a:latin typeface="Cambria Math" panose="02040503050406030204" pitchFamily="18" charset="0"/>
+                                </a:rPr>
+                                <m:t>𝑥</m:t>
+                              </m:r>
+                            </m:e>
+                            <m:sub>
+                              <m:r>
+                                <a:rPr lang="en-US" sz="2400" b="0" i="1" smtClean="0">
+                                  <a:latin typeface="Cambria Math" panose="02040503050406030204" pitchFamily="18" charset="0"/>
+                                </a:rPr>
+                                <m:t>1</m:t>
+                              </m:r>
+                            </m:sub>
+                          </m:sSub>
+                        </m:e>
+                      </m:d>
+                      <m:r>
+                        <a:rPr lang="en-US" sz="2000" i="1">
+                          <a:latin typeface="Cambria Math" panose="02040503050406030204" pitchFamily="18" charset="0"/>
+                        </a:rPr>
+                        <m:t>&gt;0</m:t>
+                      </m:r>
+                    </m:oMath>
+                  </m:oMathPara>
                 </a14:m>
                 <a:endParaRPr lang="en-US" sz="2000" dirty="0" smtClean="0"/>
               </a:p>
@@ -19824,7 +19789,6 @@
                   <a:rPr lang="en-US" sz="2600" dirty="0" smtClean="0"/>
                   <a:t> </a:t>
                 </a:r>
-                <a:endParaRPr lang="en-US" sz="2600" dirty="0" smtClean="0"/>
               </a:p>
               <a:p>
                 <a:pPr marL="457200" lvl="1" indent="0">

</xml_diff>

<commit_message>
more changes in slides for mid-term
</commit_message>
<xml_diff>
--- a/report/midterm.pptx
+++ b/report/midterm.pptx
@@ -13179,8 +13179,8 @@
           </a:p>
         </p:txBody>
       </p:sp>
-      <mc:AlternateContent xmlns:mc="http://schemas.openxmlformats.org/markup-compatibility/2006" xmlns:a14="http://schemas.microsoft.com/office/drawing/2010/main">
-        <mc:Choice Requires="a14">
+      <mc:AlternateContent xmlns:mc="http://schemas.openxmlformats.org/markup-compatibility/2006">
+        <mc:Choice xmlns:a14="http://schemas.microsoft.com/office/drawing/2010/main" Requires="a14">
           <p:sp>
             <p:nvSpPr>
               <p:cNvPr id="3" name="Content Placeholder 2"/>
@@ -13262,8 +13262,19 @@
                 </a:r>
                 <a:r>
                   <a:rPr lang="en-US" sz="2400" dirty="0" smtClean="0"/>
-                  <a:t> to select the box which is more likely to make the constraint SAT.</a:t>
+                  <a:t> to select the box which is more likely to make the constraint SAT</a:t>
                 </a:r>
+                <a:r>
+                  <a:rPr lang="en-US" sz="2400" dirty="0" smtClean="0"/>
+                  <a:t>.</a:t>
+                </a:r>
+              </a:p>
+              <a:p>
+                <a:r>
+                  <a:rPr lang="en-US" sz="2600" dirty="0" smtClean="0"/>
+                  <a:t>Currently, we evaluate intervals by IA, choosing the interval with longer Sat length.</a:t>
+                </a:r>
+                <a:endParaRPr lang="en-US" sz="2600" dirty="0" smtClean="0"/>
               </a:p>
               <a:p>
                 <a:r>
@@ -13303,7 +13314,7 @@
             </p:txBody>
           </p:sp>
         </mc:Choice>
-        <mc:Fallback xmlns="">
+        <mc:Fallback>
           <p:sp>
             <p:nvSpPr>
               <p:cNvPr id="3" name="Content Placeholder 2"/>
@@ -14000,6 +14011,109 @@
                       </p:childTnLst>
                     </p:cTn>
                   </p:par>
+                  <p:par>
+                    <p:cTn id="39" fill="hold">
+                      <p:stCondLst>
+                        <p:cond delay="indefinite"/>
+                      </p:stCondLst>
+                      <p:childTnLst>
+                        <p:par>
+                          <p:cTn id="40" fill="hold">
+                            <p:stCondLst>
+                              <p:cond delay="0"/>
+                            </p:stCondLst>
+                            <p:childTnLst>
+                              <p:par>
+                                <p:cTn id="41" presetID="2" presetClass="entr" presetSubtype="4" fill="hold" nodeType="clickEffect">
+                                  <p:stCondLst>
+                                    <p:cond delay="0"/>
+                                  </p:stCondLst>
+                                  <p:childTnLst>
+                                    <p:set>
+                                      <p:cBhvr>
+                                        <p:cTn id="42" dur="1" fill="hold">
+                                          <p:stCondLst>
+                                            <p:cond delay="0"/>
+                                          </p:stCondLst>
+                                        </p:cTn>
+                                        <p:tgtEl>
+                                          <p:spTgt spid="3">
+                                            <p:txEl>
+                                              <p:pRg st="6" end="6"/>
+                                            </p:txEl>
+                                          </p:spTgt>
+                                        </p:tgtEl>
+                                        <p:attrNameLst>
+                                          <p:attrName>style.visibility</p:attrName>
+                                        </p:attrNameLst>
+                                      </p:cBhvr>
+                                      <p:to>
+                                        <p:strVal val="visible"/>
+                                      </p:to>
+                                    </p:set>
+                                    <p:anim calcmode="lin" valueType="num">
+                                      <p:cBhvr additive="base">
+                                        <p:cTn id="43" dur="500" fill="hold"/>
+                                        <p:tgtEl>
+                                          <p:spTgt spid="3">
+                                            <p:txEl>
+                                              <p:pRg st="6" end="6"/>
+                                            </p:txEl>
+                                          </p:spTgt>
+                                        </p:tgtEl>
+                                        <p:attrNameLst>
+                                          <p:attrName>ppt_x</p:attrName>
+                                        </p:attrNameLst>
+                                      </p:cBhvr>
+                                      <p:tavLst>
+                                        <p:tav tm="0">
+                                          <p:val>
+                                            <p:strVal val="#ppt_x"/>
+                                          </p:val>
+                                        </p:tav>
+                                        <p:tav tm="100000">
+                                          <p:val>
+                                            <p:strVal val="#ppt_x"/>
+                                          </p:val>
+                                        </p:tav>
+                                      </p:tavLst>
+                                    </p:anim>
+                                    <p:anim calcmode="lin" valueType="num">
+                                      <p:cBhvr additive="base">
+                                        <p:cTn id="44" dur="500" fill="hold"/>
+                                        <p:tgtEl>
+                                          <p:spTgt spid="3">
+                                            <p:txEl>
+                                              <p:pRg st="6" end="6"/>
+                                            </p:txEl>
+                                          </p:spTgt>
+                                        </p:tgtEl>
+                                        <p:attrNameLst>
+                                          <p:attrName>ppt_y</p:attrName>
+                                        </p:attrNameLst>
+                                      </p:cBhvr>
+                                      <p:tavLst>
+                                        <p:tav tm="0">
+                                          <p:val>
+                                            <p:strVal val="1+#ppt_h/2"/>
+                                          </p:val>
+                                        </p:tav>
+                                        <p:tav tm="100000">
+                                          <p:val>
+                                            <p:strVal val="#ppt_y"/>
+                                          </p:val>
+                                        </p:tav>
+                                      </p:tavLst>
+                                    </p:anim>
+                                  </p:childTnLst>
+                                </p:cTn>
+                              </p:par>
+                            </p:childTnLst>
+                          </p:cTn>
+                        </p:par>
+                      </p:childTnLst>
+                    </p:cTn>
+                  </p:par>
                 </p:childTnLst>
               </p:cTn>
               <p:prevCondLst>
@@ -15239,8 +15353,8 @@
           </a:p>
         </p:txBody>
       </p:sp>
-      <mc:AlternateContent xmlns:mc="http://schemas.openxmlformats.org/markup-compatibility/2006" xmlns:a14="http://schemas.microsoft.com/office/drawing/2010/main">
-        <mc:Choice Requires="a14">
+      <mc:AlternateContent xmlns:mc="http://schemas.openxmlformats.org/markup-compatibility/2006">
+        <mc:Choice xmlns:a14="http://schemas.microsoft.com/office/drawing/2010/main" Requires="a14">
           <p:sp>
             <p:nvSpPr>
               <p:cNvPr id="3" name="Content Placeholder 2"/>
@@ -15253,8 +15367,8 @@
             </p:nvSpPr>
             <p:spPr>
               <a:xfrm>
-                <a:off x="1311579" y="1669960"/>
-                <a:ext cx="10704410" cy="3777622"/>
+                <a:off x="1311579" y="1669959"/>
+                <a:ext cx="10704410" cy="5068591"/>
               </a:xfrm>
             </p:spPr>
             <p:txBody>
@@ -15264,31 +15378,37 @@
               <a:lstStyle/>
               <a:p>
                 <a:r>
+                  <a:rPr lang="en-US" sz="2400" dirty="0" err="1" smtClean="0"/>
+                  <a:t>Buchberger</a:t>
+                </a:r>
+                <a:r>
                   <a:rPr lang="en-US" sz="2400" dirty="0" smtClean="0"/>
-                  <a:t>We will use the rewrite approach.</a:t>
+                  <a:t> Algorithm</a:t>
                 </a:r>
+                <a:endParaRPr lang="en-US" sz="2400" dirty="0" smtClean="0"/>
               </a:p>
               <a:p>
+                <a:pPr lvl="1"/>
                 <a:r>
-                  <a:rPr lang="en-US" sz="2400" dirty="0" smtClean="0"/>
+                  <a:rPr lang="en-US" sz="2200" dirty="0" smtClean="0"/>
                   <a:t>Distributive normal form: </a:t>
                 </a:r>
               </a:p>
               <a:p>
-                <a:pPr lvl="1"/>
+                <a:pPr lvl="2"/>
                 <a14:m>
                   <m:oMath xmlns:m="http://schemas.openxmlformats.org/officeDocument/2006/math">
                     <m:sSup>
                       <m:sSupPr>
                         <m:ctrlPr>
-                          <a:rPr lang="en-US" sz="2400" i="1" smtClean="0">
+                          <a:rPr lang="en-US" sz="2200" i="1" smtClean="0">
                             <a:latin typeface="Cambria Math" panose="02040503050406030204" pitchFamily="18" charset="0"/>
                           </a:rPr>
                         </m:ctrlPr>
                       </m:sSupPr>
                       <m:e>
                         <m:r>
-                          <a:rPr lang="en-US" sz="2400" b="0" i="1" smtClean="0">
+                          <a:rPr lang="en-US" sz="2200" b="0" i="1" smtClean="0">
                             <a:latin typeface="Cambria Math" panose="02040503050406030204" pitchFamily="18" charset="0"/>
                           </a:rPr>
                           <m:t>𝑥</m:t>
@@ -15296,7 +15416,7 @@
                       </m:e>
                       <m:sup>
                         <m:r>
-                          <a:rPr lang="en-US" sz="2400" b="0" i="1" smtClean="0">
+                          <a:rPr lang="en-US" sz="2200" b="0" i="1" smtClean="0">
                             <a:latin typeface="Cambria Math" panose="02040503050406030204" pitchFamily="18" charset="0"/>
                           </a:rPr>
                           <m:t>2</m:t>
@@ -15306,26 +15426,26 @@
                     <m:d>
                       <m:dPr>
                         <m:ctrlPr>
-                          <a:rPr lang="en-US" sz="2400" b="0" i="1" smtClean="0">
+                          <a:rPr lang="en-US" sz="2200" b="0" i="1" smtClean="0">
                             <a:latin typeface="Cambria Math" panose="02040503050406030204" pitchFamily="18" charset="0"/>
                           </a:rPr>
                         </m:ctrlPr>
                       </m:dPr>
                       <m:e>
                         <m:r>
-                          <a:rPr lang="en-US" sz="2400" b="0" i="1" smtClean="0">
+                          <a:rPr lang="en-US" sz="2200" b="0" i="1" smtClean="0">
                             <a:latin typeface="Cambria Math" panose="02040503050406030204" pitchFamily="18" charset="0"/>
                           </a:rPr>
                           <m:t>𝑦</m:t>
                         </m:r>
                         <m:r>
-                          <a:rPr lang="en-US" sz="2400" b="0" i="1" smtClean="0">
+                          <a:rPr lang="en-US" sz="2200" b="0" i="1" smtClean="0">
                             <a:latin typeface="Cambria Math" panose="02040503050406030204" pitchFamily="18" charset="0"/>
                           </a:rPr>
                           <m:t>+</m:t>
                         </m:r>
                         <m:r>
-                          <a:rPr lang="en-US" sz="2400" b="0" i="1" smtClean="0">
+                          <a:rPr lang="en-US" sz="2200" b="0" i="1" smtClean="0">
                             <a:latin typeface="Cambria Math" panose="02040503050406030204" pitchFamily="18" charset="0"/>
                           </a:rPr>
                           <m:t>𝑧</m:t>
@@ -15333,7 +15453,7 @@
                       </m:e>
                     </m:d>
                     <m:r>
-                      <a:rPr lang="en-US" sz="2400" b="0" i="1" smtClean="0">
+                      <a:rPr lang="en-US" sz="2200" b="0" i="1" smtClean="0">
                         <a:latin typeface="Cambria Math" panose="02040503050406030204" pitchFamily="18" charset="0"/>
                       </a:rPr>
                       <m:t>→</m:t>
@@ -15341,14 +15461,14 @@
                     <m:sSup>
                       <m:sSupPr>
                         <m:ctrlPr>
-                          <a:rPr lang="en-US" sz="2400" i="1">
+                          <a:rPr lang="en-US" sz="2200" i="1">
                             <a:latin typeface="Cambria Math" panose="02040503050406030204" pitchFamily="18" charset="0"/>
                           </a:rPr>
                         </m:ctrlPr>
                       </m:sSupPr>
                       <m:e>
                         <m:r>
-                          <a:rPr lang="en-US" sz="2400" i="1">
+                          <a:rPr lang="en-US" sz="2200" i="1">
                             <a:latin typeface="Cambria Math" panose="02040503050406030204" pitchFamily="18" charset="0"/>
                           </a:rPr>
                           <m:t>𝑥</m:t>
@@ -15356,7 +15476,7 @@
                       </m:e>
                       <m:sup>
                         <m:r>
-                          <a:rPr lang="en-US" sz="2400" i="1">
+                          <a:rPr lang="en-US" sz="2200" i="1">
                             <a:latin typeface="Cambria Math" panose="02040503050406030204" pitchFamily="18" charset="0"/>
                           </a:rPr>
                           <m:t>2</m:t>
@@ -15364,13 +15484,13 @@
                       </m:sup>
                     </m:sSup>
                     <m:r>
-                      <a:rPr lang="en-US" sz="2400" b="0" i="1" smtClean="0">
+                      <a:rPr lang="en-US" sz="2200" b="0" i="1" smtClean="0">
                         <a:latin typeface="Cambria Math" panose="02040503050406030204" pitchFamily="18" charset="0"/>
                       </a:rPr>
                       <m:t>𝑦</m:t>
                     </m:r>
                     <m:r>
-                      <a:rPr lang="en-US" sz="2400" b="0" i="1" smtClean="0">
+                      <a:rPr lang="en-US" sz="2200" b="0" i="1" smtClean="0">
                         <a:latin typeface="Cambria Math" panose="02040503050406030204" pitchFamily="18" charset="0"/>
                       </a:rPr>
                       <m:t>+</m:t>
@@ -15378,14 +15498,14 @@
                     <m:sSup>
                       <m:sSupPr>
                         <m:ctrlPr>
-                          <a:rPr lang="en-US" sz="2400" i="1">
+                          <a:rPr lang="en-US" sz="2200" i="1">
                             <a:latin typeface="Cambria Math" panose="02040503050406030204" pitchFamily="18" charset="0"/>
                           </a:rPr>
                         </m:ctrlPr>
                       </m:sSupPr>
                       <m:e>
                         <m:r>
-                          <a:rPr lang="en-US" sz="2400" i="1">
+                          <a:rPr lang="en-US" sz="2200" i="1">
                             <a:latin typeface="Cambria Math" panose="02040503050406030204" pitchFamily="18" charset="0"/>
                           </a:rPr>
                           <m:t>𝑥</m:t>
@@ -15393,7 +15513,7 @@
                       </m:e>
                       <m:sup>
                         <m:r>
-                          <a:rPr lang="en-US" sz="2400" i="1">
+                          <a:rPr lang="en-US" sz="2200" i="1">
                             <a:latin typeface="Cambria Math" panose="02040503050406030204" pitchFamily="18" charset="0"/>
                           </a:rPr>
                           <m:t>2</m:t>
@@ -15401,42 +15521,42 @@
                       </m:sup>
                     </m:sSup>
                     <m:r>
-                      <a:rPr lang="en-US" sz="2400" b="0" i="1" smtClean="0">
+                      <a:rPr lang="en-US" sz="2200" b="0" i="1" smtClean="0">
                         <a:latin typeface="Cambria Math" panose="02040503050406030204" pitchFamily="18" charset="0"/>
                       </a:rPr>
                       <m:t>𝑧</m:t>
                     </m:r>
                   </m:oMath>
                 </a14:m>
-                <a:endParaRPr lang="en-US" sz="2400" dirty="0" smtClean="0"/>
+                <a:endParaRPr lang="en-US" sz="2200" dirty="0" smtClean="0"/>
               </a:p>
               <a:p>
-                <a:pPr lvl="1"/>
+                <a:pPr lvl="2"/>
                 <a14:m>
                   <m:oMath xmlns:m="http://schemas.openxmlformats.org/officeDocument/2006/math">
                     <m:sSup>
                       <m:sSupPr>
                         <m:ctrlPr>
-                          <a:rPr lang="en-US" sz="2400" i="1">
+                          <a:rPr lang="en-US" sz="2200" i="1">
                             <a:latin typeface="Cambria Math" panose="02040503050406030204" pitchFamily="18" charset="0"/>
                           </a:rPr>
                         </m:ctrlPr>
                       </m:sSupPr>
                       <m:e>
                         <m:r>
-                          <a:rPr lang="en-US" sz="2400" b="0" i="1" smtClean="0">
+                          <a:rPr lang="en-US" sz="2200" b="0" i="1" smtClean="0">
                             <a:latin typeface="Cambria Math" panose="02040503050406030204" pitchFamily="18" charset="0"/>
                           </a:rPr>
                           <m:t>𝑦</m:t>
                         </m:r>
                         <m:r>
-                          <a:rPr lang="en-US" sz="2400" b="0" i="1" smtClean="0">
+                          <a:rPr lang="en-US" sz="2200" b="0" i="1" smtClean="0">
                             <a:latin typeface="Cambria Math" panose="02040503050406030204" pitchFamily="18" charset="0"/>
                           </a:rPr>
                           <m:t>+ </m:t>
                         </m:r>
                         <m:r>
-                          <a:rPr lang="en-US" sz="2400" i="1">
+                          <a:rPr lang="en-US" sz="2200" i="1">
                             <a:latin typeface="Cambria Math" panose="02040503050406030204" pitchFamily="18" charset="0"/>
                           </a:rPr>
                           <m:t>𝑥</m:t>
@@ -15444,7 +15564,7 @@
                       </m:e>
                       <m:sup>
                         <m:r>
-                          <a:rPr lang="en-US" sz="2400" i="1">
+                          <a:rPr lang="en-US" sz="2200" i="1">
                             <a:latin typeface="Cambria Math" panose="02040503050406030204" pitchFamily="18" charset="0"/>
                           </a:rPr>
                           <m:t>2</m:t>
@@ -15452,19 +15572,19 @@
                       </m:sup>
                     </m:sSup>
                     <m:r>
-                      <a:rPr lang="en-US" sz="2400" b="0" i="1" smtClean="0">
+                      <a:rPr lang="en-US" sz="2200" b="0" i="1" smtClean="0">
                         <a:latin typeface="Cambria Math" panose="02040503050406030204" pitchFamily="18" charset="0"/>
                       </a:rPr>
                       <m:t> −2</m:t>
                     </m:r>
                     <m:r>
-                      <a:rPr lang="en-US" sz="2400" b="0" i="1" smtClean="0">
+                      <a:rPr lang="en-US" sz="2200" b="0" i="1" smtClean="0">
                         <a:latin typeface="Cambria Math" panose="02040503050406030204" pitchFamily="18" charset="0"/>
                       </a:rPr>
                       <m:t>𝑦</m:t>
                     </m:r>
                     <m:r>
-                      <a:rPr lang="en-US" sz="2400" b="0" i="1" smtClean="0">
+                      <a:rPr lang="en-US" sz="2200" b="0" i="1" smtClean="0">
                         <a:latin typeface="Cambria Math" panose="02040503050406030204" pitchFamily="18" charset="0"/>
                       </a:rPr>
                       <m:t> →</m:t>
@@ -15472,14 +15592,14 @@
                     <m:sSup>
                       <m:sSupPr>
                         <m:ctrlPr>
-                          <a:rPr lang="en-US" sz="2400" i="1">
+                          <a:rPr lang="en-US" sz="2200" i="1">
                             <a:latin typeface="Cambria Math" panose="02040503050406030204" pitchFamily="18" charset="0"/>
                           </a:rPr>
                         </m:ctrlPr>
                       </m:sSupPr>
                       <m:e>
                         <m:r>
-                          <a:rPr lang="en-US" sz="2400" i="1">
+                          <a:rPr lang="en-US" sz="2200" i="1">
                             <a:latin typeface="Cambria Math" panose="02040503050406030204" pitchFamily="18" charset="0"/>
                           </a:rPr>
                           <m:t>𝑥</m:t>
@@ -15487,7 +15607,7 @@
                       </m:e>
                       <m:sup>
                         <m:r>
-                          <a:rPr lang="en-US" sz="2400" i="1">
+                          <a:rPr lang="en-US" sz="2200" i="1">
                             <a:latin typeface="Cambria Math" panose="02040503050406030204" pitchFamily="18" charset="0"/>
                           </a:rPr>
                           <m:t>2</m:t>
@@ -15495,57 +15615,90 @@
                       </m:sup>
                     </m:sSup>
                     <m:r>
-                      <a:rPr lang="en-US" sz="2400" b="0" i="1" smtClean="0">
+                      <a:rPr lang="en-US" sz="2200" b="0" i="1" smtClean="0">
                         <a:latin typeface="Cambria Math" panose="02040503050406030204" pitchFamily="18" charset="0"/>
                       </a:rPr>
                       <m:t>−</m:t>
                     </m:r>
                     <m:r>
-                      <a:rPr lang="en-US" sz="2400" b="0" i="1" smtClean="0">
+                      <a:rPr lang="en-US" sz="2200" b="0" i="1" smtClean="0">
                         <a:latin typeface="Cambria Math" panose="02040503050406030204" pitchFamily="18" charset="0"/>
                       </a:rPr>
                       <m:t>𝑦</m:t>
                     </m:r>
                   </m:oMath>
                 </a14:m>
-                <a:endParaRPr lang="en-US" sz="2400" dirty="0" smtClean="0"/>
+                <a:endParaRPr lang="en-US" sz="2200" dirty="0" smtClean="0"/>
               </a:p>
               <a:p>
+                <a:pPr lvl="2"/>
                 <a:r>
-                  <a:rPr lang="en-US" sz="2400" dirty="0" smtClean="0"/>
-                  <a:t>We need to use associativity</a:t>
+                  <a:rPr lang="en-US" sz="2000" dirty="0"/>
+                  <a:t>associativity and </a:t>
                 </a:r>
                 <a:r>
-                  <a:rPr lang="en-US" sz="2400" dirty="0"/>
-                  <a:t> </a:t>
-                </a:r>
-                <a:r>
-                  <a:rPr lang="en-US" sz="2400" dirty="0" smtClean="0"/>
-                  <a:t>and </a:t>
-                </a:r>
-                <a:r>
-                  <a:rPr lang="en-US" sz="2400" dirty="0" err="1" smtClean="0"/>
+                  <a:rPr lang="en-US" sz="2000" dirty="0" err="1"/>
                   <a:t>commutativity</a:t>
                 </a:r>
                 <a:r>
-                  <a:rPr lang="en-US" sz="2400" dirty="0"/>
-                  <a:t> </a:t>
+                  <a:rPr lang="en-US" sz="2000" dirty="0"/>
+                  <a:t> of addition and </a:t>
                 </a:r>
                 <a:r>
+                  <a:rPr lang="en-US" sz="2000" dirty="0" smtClean="0"/>
+                  <a:t>multiplication</a:t>
+                </a:r>
+                <a:endParaRPr lang="en-US" sz="2200" dirty="0" smtClean="0"/>
+              </a:p>
+              <a:p>
+                <a:pPr lvl="1"/>
+                <a:r>
                   <a:rPr lang="en-US" sz="2400" dirty="0" smtClean="0"/>
-                  <a:t>of addition and multiplication</a:t>
+                  <a:t>Division algorithm between polynomials.</a:t>
                 </a:r>
               </a:p>
               <a:p>
                 <a:r>
+                  <a:rPr lang="en-US" sz="2600" dirty="0"/>
+                  <a:t>We will use the rewrite approach</a:t>
+                </a:r>
+                <a:r>
+                  <a:rPr lang="en-US" sz="2600" dirty="0" smtClean="0"/>
+                  <a:t>.</a:t>
+                </a:r>
+              </a:p>
+              <a:p>
+                <a:pPr lvl="1"/>
+                <a:r>
                   <a:rPr lang="en-US" sz="2400" dirty="0" smtClean="0"/>
-                  <a:t>For efficient AC rewriting system, we will use Maude.</a:t>
+                  <a:t>Take advantages of efficient (AC) rewriting of rewriting framework.</a:t>
                 </a:r>
+                <a:endParaRPr lang="en-US" sz="2400" dirty="0" smtClean="0"/>
+              </a:p>
+              <a:p>
+                <a:pPr lvl="1"/>
+                <a:r>
+                  <a:rPr lang="en-US" sz="2200" dirty="0"/>
+                  <a:t>W</a:t>
+                </a:r>
+                <a:r>
+                  <a:rPr lang="en-US" sz="2200" dirty="0" smtClean="0"/>
+                  <a:t>e </a:t>
+                </a:r>
+                <a:r>
+                  <a:rPr lang="en-US" sz="2200" dirty="0" smtClean="0"/>
+                  <a:t>will use </a:t>
+                </a:r>
+                <a:r>
+                  <a:rPr lang="en-US" sz="2200" dirty="0" smtClean="0"/>
+                  <a:t>Maude, a high performance rewriting framework.</a:t>
+                </a:r>
+                <a:endParaRPr lang="en-US" sz="2200" dirty="0" smtClean="0"/>
               </a:p>
             </p:txBody>
           </p:sp>
         </mc:Choice>
-        <mc:Fallback xmlns="">
+        <mc:Fallback>
           <p:sp>
             <p:nvSpPr>
               <p:cNvPr id="3" name="Content Placeholder 2"/>
@@ -15558,13 +15711,13 @@
             </p:nvSpPr>
             <p:spPr>
               <a:xfrm>
-                <a:off x="1311579" y="1669960"/>
-                <a:ext cx="10704410" cy="3777622"/>
+                <a:off x="1311579" y="1669959"/>
+                <a:ext cx="10704410" cy="5068591"/>
               </a:xfrm>
               <a:blipFill rotWithShape="0">
                 <a:blip r:embed="rId2"/>
                 <a:stretch>
-                  <a:fillRect l="-797" t="-1290"/>
+                  <a:fillRect l="-911" t="-963"/>
                 </a:stretch>
               </a:blipFill>
             </p:spPr>
@@ -16476,8 +16629,20 @@
             </a:r>
             <a:r>
               <a:rPr lang="en-US" sz="2400" dirty="0" smtClean="0"/>
-              <a:t>. </a:t>
-            </a:r>
+              <a:t>.</a:t>
+            </a:r>
+          </a:p>
+          <a:p>
+            <a:pPr lvl="2"/>
+            <a:r>
+              <a:rPr lang="en-US" sz="2000" dirty="0"/>
+              <a:t>Resolution rule</a:t>
+            </a:r>
+            <a:r>
+              <a:rPr lang="en-US" sz="2000" dirty="0" smtClean="0"/>
+              <a:t>:</a:t>
+            </a:r>
+            <a:endParaRPr lang="en-US" sz="2200" dirty="0" smtClean="0"/>
           </a:p>
           <a:p>
             <a:pPr lvl="1"/>
@@ -16548,6 +16713,40 @@
           </a:p>
         </p:txBody>
       </p:sp>
+      <p:pic>
+        <p:nvPicPr>
+          <p:cNvPr id="6" name="Picture 5"/>
+          <p:cNvPicPr>
+            <a:picLocks noChangeAspect="1"/>
+          </p:cNvPicPr>
+          <p:nvPr>
+            <p:custDataLst>
+              <p:tags r:id="rId1"/>
+            </p:custDataLst>
+          </p:nvPr>
+        </p:nvPicPr>
+        <p:blipFill>
+          <a:blip r:embed="rId3" cstate="print">
+            <a:extLst>
+              <a:ext uri="{28A0092B-C50C-407E-A947-70E740481C1C}">
+                <a14:useLocalDpi xmlns:a14="http://schemas.microsoft.com/office/drawing/2010/main" val="0"/>
+              </a:ext>
+            </a:extLst>
+          </a:blip>
+          <a:stretch>
+            <a:fillRect/>
+          </a:stretch>
+        </p:blipFill>
+        <p:spPr>
+          <a:xfrm>
+            <a:off x="5760995" y="3635632"/>
+            <a:ext cx="3449955" cy="316230"/>
+          </a:xfrm>
+          <a:prstGeom prst="rect">
+            <a:avLst/>
+          </a:prstGeom>
+        </p:spPr>
+      </p:pic>
     </p:spTree>
     <p:extLst>
       <p:ext uri="{BB962C8B-B14F-4D97-AF65-F5344CB8AC3E}">
@@ -17601,150 +17800,6 @@
           </a:p>
         </p:txBody>
       </p:sp>
-      <p:pic>
-        <p:nvPicPr>
-          <p:cNvPr id="5" name="Picture 4"/>
-          <p:cNvPicPr>
-            <a:picLocks noChangeAspect="1"/>
-          </p:cNvPicPr>
-          <p:nvPr/>
-        </p:nvPicPr>
-        <p:blipFill>
-          <a:blip r:embed="rId2"/>
-          <a:stretch>
-            <a:fillRect/>
-          </a:stretch>
-        </p:blipFill>
-        <p:spPr>
-          <a:xfrm>
-            <a:off x="1562100" y="1466850"/>
-            <a:ext cx="3581400" cy="438150"/>
-          </a:xfrm>
-          <a:prstGeom prst="rect">
-            <a:avLst/>
-          </a:prstGeom>
-        </p:spPr>
-      </p:pic>
-      <p:pic>
-        <p:nvPicPr>
-          <p:cNvPr id="6" name="Picture 5"/>
-          <p:cNvPicPr>
-            <a:picLocks noChangeAspect="1"/>
-          </p:cNvPicPr>
-          <p:nvPr/>
-        </p:nvPicPr>
-        <p:blipFill>
-          <a:blip r:embed="rId3"/>
-          <a:stretch>
-            <a:fillRect/>
-          </a:stretch>
-        </p:blipFill>
-        <p:spPr>
-          <a:xfrm>
-            <a:off x="1562100" y="2091073"/>
-            <a:ext cx="3933825" cy="1019175"/>
-          </a:xfrm>
-          <a:prstGeom prst="rect">
-            <a:avLst/>
-          </a:prstGeom>
-        </p:spPr>
-      </p:pic>
-      <p:pic>
-        <p:nvPicPr>
-          <p:cNvPr id="7" name="Picture 6"/>
-          <p:cNvPicPr>
-            <a:picLocks noChangeAspect="1"/>
-          </p:cNvPicPr>
-          <p:nvPr/>
-        </p:nvPicPr>
-        <p:blipFill>
-          <a:blip r:embed="rId4"/>
-          <a:stretch>
-            <a:fillRect/>
-          </a:stretch>
-        </p:blipFill>
-        <p:spPr>
-          <a:xfrm>
-            <a:off x="6703276" y="1382971"/>
-            <a:ext cx="3829050" cy="533400"/>
-          </a:xfrm>
-          <a:prstGeom prst="rect">
-            <a:avLst/>
-          </a:prstGeom>
-        </p:spPr>
-      </p:pic>
-      <p:pic>
-        <p:nvPicPr>
-          <p:cNvPr id="8" name="Picture 7"/>
-          <p:cNvPicPr>
-            <a:picLocks noChangeAspect="1"/>
-          </p:cNvPicPr>
-          <p:nvPr/>
-        </p:nvPicPr>
-        <p:blipFill>
-          <a:blip r:embed="rId5"/>
-          <a:stretch>
-            <a:fillRect/>
-          </a:stretch>
-        </p:blipFill>
-        <p:spPr>
-          <a:xfrm>
-            <a:off x="6703276" y="2057009"/>
-            <a:ext cx="5172075" cy="1447800"/>
-          </a:xfrm>
-          <a:prstGeom prst="rect">
-            <a:avLst/>
-          </a:prstGeom>
-        </p:spPr>
-      </p:pic>
-      <p:pic>
-        <p:nvPicPr>
-          <p:cNvPr id="9" name="Picture 8"/>
-          <p:cNvPicPr>
-            <a:picLocks noChangeAspect="1"/>
-          </p:cNvPicPr>
-          <p:nvPr/>
-        </p:nvPicPr>
-        <p:blipFill>
-          <a:blip r:embed="rId6"/>
-          <a:stretch>
-            <a:fillRect/>
-          </a:stretch>
-        </p:blipFill>
-        <p:spPr>
-          <a:xfrm>
-            <a:off x="1566393" y="3338848"/>
-            <a:ext cx="1657350" cy="333375"/>
-          </a:xfrm>
-          <a:prstGeom prst="rect">
-            <a:avLst/>
-          </a:prstGeom>
-        </p:spPr>
-      </p:pic>
-      <p:pic>
-        <p:nvPicPr>
-          <p:cNvPr id="10" name="Picture 9"/>
-          <p:cNvPicPr>
-            <a:picLocks noChangeAspect="1"/>
-          </p:cNvPicPr>
-          <p:nvPr/>
-        </p:nvPicPr>
-        <p:blipFill>
-          <a:blip r:embed="rId7"/>
-          <a:stretch>
-            <a:fillRect/>
-          </a:stretch>
-        </p:blipFill>
-        <p:spPr>
-          <a:xfrm>
-            <a:off x="6703276" y="3620999"/>
-            <a:ext cx="2200275" cy="390525"/>
-          </a:xfrm>
-          <a:prstGeom prst="rect">
-            <a:avLst/>
-          </a:prstGeom>
-        </p:spPr>
-      </p:pic>
       <p:sp>
         <p:nvSpPr>
           <p:cNvPr id="11" name="TextBox 10"/>
@@ -17753,7 +17808,7 @@
         </p:nvSpPr>
         <p:spPr>
           <a:xfrm>
-            <a:off x="1914686" y="4822199"/>
+            <a:off x="1224448" y="5256723"/>
             <a:ext cx="9265678" cy="461665"/>
           </a:xfrm>
           <a:prstGeom prst="rect">
@@ -17795,8 +17850,212 @@
         </p:blipFill>
         <p:spPr>
           <a:xfrm>
-            <a:off x="7142364" y="4832150"/>
+            <a:off x="6489983" y="5256723"/>
             <a:ext cx="1113857" cy="467545"/>
+          </a:xfrm>
+          <a:prstGeom prst="rect">
+            <a:avLst/>
+          </a:prstGeom>
+        </p:spPr>
+      </p:pic>
+      <p:pic>
+        <p:nvPicPr>
+          <p:cNvPr id="13" name="Picture 12"/>
+          <p:cNvPicPr>
+            <a:picLocks noChangeAspect="1"/>
+          </p:cNvPicPr>
+          <p:nvPr>
+            <p:custDataLst>
+              <p:tags r:id="rId1"/>
+            </p:custDataLst>
+          </p:nvPr>
+        </p:nvPicPr>
+        <p:blipFill>
+          <a:blip r:embed="rId9" cstate="print">
+            <a:extLst>
+              <a:ext uri="{28A0092B-C50C-407E-A947-70E740481C1C}">
+                <a14:useLocalDpi xmlns:a14="http://schemas.microsoft.com/office/drawing/2010/main" val="0"/>
+              </a:ext>
+            </a:extLst>
+          </a:blip>
+          <a:stretch>
+            <a:fillRect/>
+          </a:stretch>
+        </p:blipFill>
+        <p:spPr>
+          <a:xfrm>
+            <a:off x="785491" y="2583153"/>
+            <a:ext cx="4649058" cy="1053692"/>
+          </a:xfrm>
+          <a:prstGeom prst="rect">
+            <a:avLst/>
+          </a:prstGeom>
+        </p:spPr>
+      </p:pic>
+      <p:pic>
+        <p:nvPicPr>
+          <p:cNvPr id="15" name="Picture 14"/>
+          <p:cNvPicPr>
+            <a:picLocks noChangeAspect="1"/>
+          </p:cNvPicPr>
+          <p:nvPr>
+            <p:custDataLst>
+              <p:tags r:id="rId2"/>
+            </p:custDataLst>
+          </p:nvPr>
+        </p:nvPicPr>
+        <p:blipFill>
+          <a:blip r:embed="rId10" cstate="print">
+            <a:extLst>
+              <a:ext uri="{28A0092B-C50C-407E-A947-70E740481C1C}">
+                <a14:useLocalDpi xmlns:a14="http://schemas.microsoft.com/office/drawing/2010/main" val="0"/>
+              </a:ext>
+            </a:extLst>
+          </a:blip>
+          <a:stretch>
+            <a:fillRect/>
+          </a:stretch>
+        </p:blipFill>
+        <p:spPr>
+          <a:xfrm>
+            <a:off x="1063153" y="1653864"/>
+            <a:ext cx="4093734" cy="293681"/>
+          </a:xfrm>
+          <a:prstGeom prst="rect">
+            <a:avLst/>
+          </a:prstGeom>
+        </p:spPr>
+      </p:pic>
+      <p:pic>
+        <p:nvPicPr>
+          <p:cNvPr id="17" name="Picture 16"/>
+          <p:cNvPicPr>
+            <a:picLocks noChangeAspect="1"/>
+          </p:cNvPicPr>
+          <p:nvPr>
+            <p:custDataLst>
+              <p:tags r:id="rId3"/>
+            </p:custDataLst>
+          </p:nvPr>
+        </p:nvPicPr>
+        <p:blipFill>
+          <a:blip r:embed="rId11" cstate="print">
+            <a:extLst>
+              <a:ext uri="{28A0092B-C50C-407E-A947-70E740481C1C}">
+                <a14:useLocalDpi xmlns:a14="http://schemas.microsoft.com/office/drawing/2010/main" val="0"/>
+              </a:ext>
+            </a:extLst>
+          </a:blip>
+          <a:stretch>
+            <a:fillRect/>
+          </a:stretch>
+        </p:blipFill>
+        <p:spPr>
+          <a:xfrm>
+            <a:off x="6104238" y="1674897"/>
+            <a:ext cx="4205951" cy="291222"/>
+          </a:xfrm>
+          <a:prstGeom prst="rect">
+            <a:avLst/>
+          </a:prstGeom>
+        </p:spPr>
+      </p:pic>
+      <p:pic>
+        <p:nvPicPr>
+          <p:cNvPr id="19" name="Picture 18"/>
+          <p:cNvPicPr>
+            <a:picLocks noChangeAspect="1"/>
+          </p:cNvPicPr>
+          <p:nvPr>
+            <p:custDataLst>
+              <p:tags r:id="rId4"/>
+            </p:custDataLst>
+          </p:nvPr>
+        </p:nvPicPr>
+        <p:blipFill>
+          <a:blip r:embed="rId12" cstate="print">
+            <a:extLst>
+              <a:ext uri="{28A0092B-C50C-407E-A947-70E740481C1C}">
+                <a14:useLocalDpi xmlns:a14="http://schemas.microsoft.com/office/drawing/2010/main" val="0"/>
+              </a:ext>
+            </a:extLst>
+          </a:blip>
+          <a:stretch>
+            <a:fillRect/>
+          </a:stretch>
+        </p:blipFill>
+        <p:spPr>
+          <a:xfrm>
+            <a:off x="5886155" y="2172810"/>
+            <a:ext cx="6089186" cy="1503764"/>
+          </a:xfrm>
+          <a:prstGeom prst="rect">
+            <a:avLst/>
+          </a:prstGeom>
+        </p:spPr>
+      </p:pic>
+      <p:pic>
+        <p:nvPicPr>
+          <p:cNvPr id="21" name="Picture 20"/>
+          <p:cNvPicPr>
+            <a:picLocks noChangeAspect="1"/>
+          </p:cNvPicPr>
+          <p:nvPr>
+            <p:custDataLst>
+              <p:tags r:id="rId5"/>
+            </p:custDataLst>
+          </p:nvPr>
+        </p:nvPicPr>
+        <p:blipFill>
+          <a:blip r:embed="rId13" cstate="print">
+            <a:extLst>
+              <a:ext uri="{28A0092B-C50C-407E-A947-70E740481C1C}">
+                <a14:useLocalDpi xmlns:a14="http://schemas.microsoft.com/office/drawing/2010/main" val="0"/>
+              </a:ext>
+            </a:extLst>
+          </a:blip>
+          <a:stretch>
+            <a:fillRect/>
+          </a:stretch>
+        </p:blipFill>
+        <p:spPr>
+          <a:xfrm>
+            <a:off x="2118483" y="3991519"/>
+            <a:ext cx="1865319" cy="261643"/>
+          </a:xfrm>
+          <a:prstGeom prst="rect">
+            <a:avLst/>
+          </a:prstGeom>
+        </p:spPr>
+      </p:pic>
+      <p:pic>
+        <p:nvPicPr>
+          <p:cNvPr id="22" name="Picture 21"/>
+          <p:cNvPicPr>
+            <a:picLocks noChangeAspect="1"/>
+          </p:cNvPicPr>
+          <p:nvPr>
+            <p:custDataLst>
+              <p:tags r:id="rId6"/>
+            </p:custDataLst>
+          </p:nvPr>
+        </p:nvPicPr>
+        <p:blipFill>
+          <a:blip r:embed="rId14" cstate="print">
+            <a:extLst>
+              <a:ext uri="{28A0092B-C50C-407E-A947-70E740481C1C}">
+                <a14:useLocalDpi xmlns:a14="http://schemas.microsoft.com/office/drawing/2010/main" val="0"/>
+              </a:ext>
+            </a:extLst>
+          </a:blip>
+          <a:stretch>
+            <a:fillRect/>
+          </a:stretch>
+        </p:blipFill>
+        <p:spPr>
+          <a:xfrm>
+            <a:off x="7633506" y="3972318"/>
+            <a:ext cx="2451559" cy="300047"/>
           </a:xfrm>
           <a:prstGeom prst="rect">
             <a:avLst/>
@@ -19458,8 +19717,8 @@
           </a:p>
         </p:txBody>
       </p:sp>
-      <mc:AlternateContent xmlns:mc="http://schemas.openxmlformats.org/markup-compatibility/2006">
-        <mc:Choice xmlns:a14="http://schemas.microsoft.com/office/drawing/2010/main" Requires="a14">
+      <mc:AlternateContent xmlns:mc="http://schemas.openxmlformats.org/markup-compatibility/2006" xmlns:a14="http://schemas.microsoft.com/office/drawing/2010/main">
+        <mc:Choice Requires="a14">
           <p:sp>
             <p:nvSpPr>
               <p:cNvPr id="3" name="Content Placeholder 2"/>
@@ -19638,11 +19897,7 @@
                 </a:r>
                 <a:r>
                   <a:rPr lang="en-US" sz="2400" dirty="0" smtClean="0"/>
-                  <a:t>here </a:t>
-                </a:r>
-                <a:r>
-                  <a:rPr lang="en-US" sz="2400" dirty="0" smtClean="0"/>
-                  <a:t>is some rational numbers </a:t>
+                  <a:t>here is some rational numbers </a:t>
                 </a:r>
                 <a14:m>
                   <m:oMath xmlns:m="http://schemas.openxmlformats.org/officeDocument/2006/math">
@@ -19708,11 +19963,7 @@
                 </a14:m>
                 <a:r>
                   <a:rPr lang="en-US" sz="2400" dirty="0" smtClean="0"/>
-                  <a:t> in </a:t>
-                </a:r>
-                <a:r>
-                  <a:rPr lang="en-US" sz="2400" dirty="0" smtClean="0"/>
-                  <a:t>which</a:t>
+                  <a:t> in which</a:t>
                 </a:r>
                 <a:endParaRPr lang="en-US" sz="2000" i="1" dirty="0" smtClean="0">
                   <a:latin typeface="Cambria Math" panose="02040503050406030204" pitchFamily="18" charset="0"/>
@@ -19803,7 +20054,7 @@
             </p:txBody>
           </p:sp>
         </mc:Choice>
-        <mc:Fallback>
+        <mc:Fallback xmlns="">
           <p:sp>
             <p:nvSpPr>
               <p:cNvPr id="3" name="Content Placeholder 2"/>
@@ -21277,6 +21528,69 @@
   <p:tag name="ORIGINALHEIGHT" val="233.25"/>
   <p:tag name="ORIGINALWIDTH" val="3043.5"/>
   <p:tag name="LATEXADDIN" val="\documentclass{article}&#10;\usepackage{amsmath}&#10;\pagestyle{empty}&#10;\begin{document}&#10;&#10;$\bigcup\limits_{R \in R(C)} \{s\downarrow_R \approx t\downarrow_R | &#10;s \approx t \in \mathcal{E} \cup CP(R) \text{ and }&#10;s\downarrow_R \neq t\downarrow_R\}$&#10;&#10;&#10;\end{document}"/>
+  <p:tag name="IGUANATEXSIZE" val="20"/>
+</p:tagLst>
+</file>
+
+<file path=ppt/tags/tag12.xml><?xml version="1.0" encoding="utf-8"?>
+<p:tagLst xmlns:a="http://schemas.openxmlformats.org/drawingml/2006/main" xmlns:r="http://schemas.openxmlformats.org/officeDocument/2006/relationships" xmlns:p="http://schemas.openxmlformats.org/presentationml/2006/main">
+  <p:tag name="ORIGINALHEIGHT" val="124.5"/>
+  <p:tag name="ORIGINALWIDTH" val="1358.25"/>
+  <p:tag name="LATEXADDIN" val="\documentclass{article}&#10;\usepackage{amsmath}&#10;\pagestyle{empty}&#10;\begin{document}&#10;&#10;$(a \lor b) \land (\neg a \lor c) \rightarrow b \lor c$&#10;&#10;\end{document}"/>
+  <p:tag name="IGUANATEXSIZE" val="20"/>
+</p:tagLst>
+</file>
+
+<file path=ppt/tags/tag13.xml><?xml version="1.0" encoding="utf-8"?>
+<p:tagLst xmlns:a="http://schemas.openxmlformats.org/drawingml/2006/main" xmlns:r="http://schemas.openxmlformats.org/officeDocument/2006/relationships" xmlns:p="http://schemas.openxmlformats.org/presentationml/2006/main">
+  <p:tag name="ORIGINALHEIGHT" val="444"/>
+  <p:tag name="ORIGINALWIDTH" val="1959"/>
+  <p:tag name="LATEXADDIN" val="\documentclass{article}&#10;\usepackage{amsmath}&#10;\pagestyle{empty}&#10;\usepackage{bussproofs}&#10;\usepackage{amssymb}&#10;\usepackage{latexsym}&#10;% This is the &quot;centered&quot; symbol&#10;\def\fCenter{{\mbox{\Large$\rightarrow$}}}&#10;&#10;% Optional to turn on the short abbreviations&#10;\EnableBpAbbreviations&#10;\begin{document}&#10;&#10;\begin{center}&#10;\AXC{$xz&gt;1$} \AXC{$x \in [0, 1]$} \AXC{$z \in [0, 1]$} \BIC{$xz \in [0, 1]$} \BIC{$1&lt;1$}&#10;\DP &#10;\end{center}&#10;&#10;&#10;\end{document}"/>
+  <p:tag name="IGUANATEXSIZE" val="20"/>
+</p:tagLst>
+</file>
+
+<file path=ppt/tags/tag14.xml><?xml version="1.0" encoding="utf-8"?>
+<p:tagLst xmlns:a="http://schemas.openxmlformats.org/drawingml/2006/main" xmlns:r="http://schemas.openxmlformats.org/officeDocument/2006/relationships" xmlns:p="http://schemas.openxmlformats.org/presentationml/2006/main">
+  <p:tag name="ORIGINALHEIGHT" val="123.75"/>
+  <p:tag name="ORIGINALWIDTH" val="1725"/>
+  <p:tag name="LATEXADDIN" val="\documentclass{article}&#10;\usepackage{amsmath}&#10;\pagestyle{empty}&#10;\usepackage{bussproofs}&#10;\usepackage{amssymb}&#10;\usepackage{latexsym}&#10;% This is the &quot;centered&quot; symbol&#10;\def\fCenter{{\mbox{\Large$\rightarrow$}}}&#10;% Optional to turn on the short abbreviations&#10;\EnableBpAbbreviations&#10;\begin{document}&#10;&#10;$x \in [0,1] \land y \in [0,10] \land z \in [0,1]$&#10;&#10;\end{document}"/>
+  <p:tag name="IGUANATEXSIZE" val="20"/>
+</p:tagLst>
+</file>
+
+<file path=ppt/tags/tag15.xml><?xml version="1.0" encoding="utf-8"?>
+<p:tagLst xmlns:a="http://schemas.openxmlformats.org/drawingml/2006/main" xmlns:r="http://schemas.openxmlformats.org/officeDocument/2006/relationships" xmlns:p="http://schemas.openxmlformats.org/presentationml/2006/main">
+  <p:tag name="ORIGINALHEIGHT" val="123.75"/>
+  <p:tag name="ORIGINALWIDTH" val="1787.25"/>
+  <p:tag name="LATEXADDIN" val="\documentclass{article}&#10;\usepackage{amsmath}&#10;\pagestyle{empty}&#10;\usepackage{bussproofs}&#10;\usepackage{amssymb}&#10;\usepackage{latexsym}&#10;% This is the &quot;centered&quot; symbol&#10;\def\fCenter{{\mbox{\Large$\rightarrow$}}}&#10;% Optional to turn on the short abbreviations&#10;\EnableBpAbbreviations&#10;\begin{document}&#10;&#10;$x \in [1,10] \land y \in [0,10] \land z \in [0,1]$&#10;&#10;\end{document}"/>
+  <p:tag name="IGUANATEXSIZE" val="20"/>
+</p:tagLst>
+</file>
+
+<file path=ppt/tags/tag16.xml><?xml version="1.0" encoding="utf-8"?>
+<p:tagLst xmlns:a="http://schemas.openxmlformats.org/drawingml/2006/main" xmlns:r="http://schemas.openxmlformats.org/officeDocument/2006/relationships" xmlns:p="http://schemas.openxmlformats.org/presentationml/2006/main">
+  <p:tag name="ORIGINALHEIGHT" val="639"/>
+  <p:tag name="ORIGINALWIDTH" val="2587.5"/>
+  <p:tag name="LATEXADDIN" val="\documentclass{article}&#10;\usepackage{amsmath}&#10;\pagestyle{empty}&#10;\usepackage{bussproofs}&#10;\usepackage{amssymb}&#10;\usepackage{latexsym}&#10;% This is the &quot;centered&quot; symbol&#10;\def\fCenter{{\mbox{\Large$\rightarrow$}}}&#10;&#10;% Optional to turn on the short abbreviations&#10;\EnableBpAbbreviations&#10;\begin{document}&#10;&#10;\begin{center}&#10;\AXC{$x^2+y^2&lt;1$} \AXC{$y \in [0, 10]$} \UnaryInfC{$y^2 \in [0, 100]$} \BIC{$x^2 &lt; 1$}&#10;\AXC{$x \in [1, 10]$} \UnaryInfC{$x^2 \in [1, 100]$} \BIC{$1&lt;1$}&#10;\DP&#10;\end{center}&#10;&#10;\end{document}"/>
+  <p:tag name="IGUANATEXSIZE" val="20"/>
+</p:tagLst>
+</file>
+
+<file path=ppt/tags/tag17.xml><?xml version="1.0" encoding="utf-8"?>
+<p:tagLst xmlns:a="http://schemas.openxmlformats.org/drawingml/2006/main" xmlns:r="http://schemas.openxmlformats.org/officeDocument/2006/relationships" xmlns:p="http://schemas.openxmlformats.org/presentationml/2006/main">
+  <p:tag name="ORIGINALHEIGHT" val="110.25"/>
+  <p:tag name="ORIGINALWIDTH" val="786"/>
+  <p:tag name="LATEXADDIN" val="\documentclass{article}&#10;\usepackage{amsmath}&#10;\pagestyle{empty}&#10;\begin{document}&#10;&#10;&#10;Interpolant: $\top$&#10;&#10;\end{document}"/>
+  <p:tag name="IGUANATEXSIZE" val="20"/>
+</p:tagLst>
+</file>
+
+<file path=ppt/tags/tag18.xml><?xml version="1.0" encoding="utf-8"?>
+<p:tagLst xmlns:a="http://schemas.openxmlformats.org/drawingml/2006/main" xmlns:r="http://schemas.openxmlformats.org/officeDocument/2006/relationships" xmlns:p="http://schemas.openxmlformats.org/presentationml/2006/main">
+  <p:tag name="ORIGINALHEIGHT" val="127.5"/>
+  <p:tag name="ORIGINALWIDTH" val="1041.75"/>
+  <p:tag name="LATEXADDIN" val="\documentclass{article}&#10;\usepackage{amsmath}&#10;\pagestyle{empty}&#10;\begin{document}&#10;&#10;Interpolant: $x^2 &lt; 1$&#10;&#10;&#10;\end{document}"/>
   <p:tag name="IGUANATEXSIZE" val="20"/>
 </p:tagLst>
 </file>

</xml_diff>

<commit_message>
more modification of slidies for mid-term
</commit_message>
<xml_diff>
--- a/report/midterm.pptx
+++ b/report/midterm.pptx
@@ -8487,32 +8487,32 @@
           <a:lstStyle/>
           <a:p>
             <a:r>
-              <a:rPr lang="en-US" sz="2400" dirty="0" smtClean="0"/>
+              <a:rPr lang="en-US" sz="2600" dirty="0" smtClean="0"/>
               <a:t>In this work:</a:t>
             </a:r>
           </a:p>
           <a:p>
             <a:pPr lvl="1"/>
             <a:r>
-              <a:rPr lang="en-US" sz="2200" dirty="0" smtClean="0"/>
+              <a:rPr lang="en-US" sz="2600" dirty="0" smtClean="0"/>
               <a:t>Improve the efficiency of </a:t>
             </a:r>
             <a:r>
-              <a:rPr lang="en-US" sz="2200" dirty="0" err="1" smtClean="0"/>
+              <a:rPr lang="en-US" sz="2600" dirty="0" err="1" smtClean="0"/>
               <a:t>raSAT</a:t>
             </a:r>
             <a:r>
-              <a:rPr lang="en-US" sz="2200" dirty="0" smtClean="0"/>
+              <a:rPr lang="en-US" sz="2600" dirty="0" smtClean="0"/>
               <a:t>.</a:t>
             </a:r>
           </a:p>
           <a:p>
             <a:pPr lvl="1"/>
             <a:r>
-              <a:rPr lang="en-US" sz="2200" dirty="0" smtClean="0"/>
+              <a:rPr lang="en-US" sz="2600" dirty="0" smtClean="0"/>
               <a:t>Extend it to handle equality.</a:t>
             </a:r>
-            <a:endParaRPr lang="en-US" sz="2200" dirty="0"/>
+            <a:endParaRPr lang="en-US" sz="2600" dirty="0"/>
           </a:p>
         </p:txBody>
       </p:sp>
@@ -8763,22 +8763,22 @@
               <a:buAutoNum type="arabicPeriod"/>
             </a:pPr>
             <a:r>
-              <a:rPr lang="en-US" sz="2400" dirty="0" smtClean="0"/>
+              <a:rPr lang="en-US" sz="2600" dirty="0" smtClean="0"/>
               <a:t>SAT, UNSAT results verification.</a:t>
             </a:r>
           </a:p>
           <a:p>
-            <a:pPr marL="857250" lvl="1" indent="-457200"/>
-            <a:r>
-              <a:rPr lang="en-US" sz="2400" dirty="0" smtClean="0"/>
+            <a:pPr marL="457200" indent="-457200"/>
+            <a:r>
+              <a:rPr lang="en-US" sz="2800" dirty="0" smtClean="0"/>
               <a:t>Round-off</a:t>
             </a:r>
             <a:r>
-              <a:rPr lang="en-US" sz="2400" dirty="0"/>
+              <a:rPr lang="en-US" sz="2800" dirty="0"/>
               <a:t>, overflow errors</a:t>
             </a:r>
             <a:r>
-              <a:rPr lang="en-US" sz="2400" dirty="0" smtClean="0"/>
+              <a:rPr lang="en-US" sz="2800" dirty="0" smtClean="0"/>
               <a:t>.</a:t>
             </a:r>
           </a:p>
@@ -8788,14 +8788,14 @@
               <a:buAutoNum type="arabicPeriod"/>
             </a:pPr>
             <a:r>
-              <a:rPr lang="en-US" sz="2400" dirty="0" smtClean="0"/>
+              <a:rPr lang="en-US" sz="2600" dirty="0" smtClean="0"/>
               <a:t>UNSAT core. </a:t>
             </a:r>
           </a:p>
           <a:p>
             <a:pPr marL="857250" lvl="1" indent="-457200"/>
             <a:r>
-              <a:rPr lang="en-US" sz="2400" dirty="0" smtClean="0"/>
+              <a:rPr lang="en-US" sz="2600" dirty="0" smtClean="0"/>
               <a:t>Running time: high, often causes timeout.</a:t>
             </a:r>
           </a:p>
@@ -8805,47 +8805,38 @@
               <a:buAutoNum type="arabicPeriod"/>
             </a:pPr>
             <a:r>
-              <a:rPr lang="en-US" sz="2400" dirty="0" smtClean="0"/>
+              <a:rPr lang="en-US" sz="2600" dirty="0" smtClean="0"/>
               <a:t>Testing phase. </a:t>
             </a:r>
-            <a:endParaRPr lang="en-US" sz="2400" dirty="0" smtClean="0"/>
           </a:p>
           <a:p>
             <a:pPr marL="857250" lvl="1" indent="-457200"/>
             <a:r>
-              <a:rPr lang="en-US" sz="2200" dirty="0" smtClean="0"/>
-              <a:t>Testing </a:t>
-            </a:r>
-            <a:r>
-              <a:rPr lang="en-US" sz="2200" dirty="0" smtClean="0"/>
-              <a:t>consumes time and memory</a:t>
-            </a:r>
-            <a:r>
-              <a:rPr lang="en-US" sz="2200" dirty="0" smtClean="0"/>
-              <a:t>.</a:t>
+              <a:rPr lang="en-US" sz="2600" dirty="0" smtClean="0"/>
+              <a:t>Testing consumes time and memory.</a:t>
             </a:r>
           </a:p>
           <a:p>
             <a:pPr marL="857250" lvl="1" indent="-457200"/>
             <a:r>
-              <a:rPr lang="en-US" sz="2200" dirty="0" smtClean="0"/>
+              <a:rPr lang="en-US" sz="2600" dirty="0" smtClean="0"/>
               <a:t>   </a:t>
             </a:r>
             <a:r>
-              <a:rPr lang="en-US" sz="2200" dirty="0"/>
+              <a:rPr lang="en-US" sz="2600" dirty="0"/>
               <a:t>variables </a:t>
             </a:r>
             <a:r>
-              <a:rPr lang="en-US" sz="2200" dirty="0">
+              <a:rPr lang="en-US" sz="2600" dirty="0">
                 <a:sym typeface="Wingdings" panose="05000000000000000000" pitchFamily="2" charset="2"/>
               </a:rPr>
               <a:t>       test cases.</a:t>
             </a:r>
-            <a:endParaRPr lang="en-US" sz="2200" dirty="0" smtClean="0"/>
+            <a:endParaRPr lang="en-US" sz="2600" dirty="0" smtClean="0"/>
           </a:p>
           <a:p>
             <a:pPr lvl="2"/>
-            <a:endParaRPr lang="en-US" sz="2000" dirty="0" smtClean="0"/>
+            <a:endParaRPr lang="en-US" sz="2600" dirty="0" smtClean="0"/>
           </a:p>
         </p:txBody>
       </p:sp>
@@ -8898,7 +8889,7 @@
         </p:blipFill>
         <p:spPr>
           <a:xfrm>
-            <a:off x="5360473" y="5154412"/>
+            <a:off x="5849870" y="5435398"/>
             <a:ext cx="289560" cy="211455"/>
           </a:xfrm>
           <a:prstGeom prst="rect">
@@ -8932,7 +8923,7 @@
         </p:blipFill>
         <p:spPr>
           <a:xfrm>
-            <a:off x="3531674" y="5226802"/>
+            <a:off x="3570311" y="5471594"/>
             <a:ext cx="160020" cy="139065"/>
           </a:xfrm>
           <a:prstGeom prst="rect">
@@ -9630,8 +9621,8 @@
           </a:p>
         </p:txBody>
       </p:sp>
-      <mc:AlternateContent xmlns:mc="http://schemas.openxmlformats.org/markup-compatibility/2006" xmlns:a14="http://schemas.microsoft.com/office/drawing/2010/main">
-        <mc:Choice Requires="a14">
+      <mc:AlternateContent xmlns:mc="http://schemas.openxmlformats.org/markup-compatibility/2006">
+        <mc:Choice xmlns:a14="http://schemas.microsoft.com/office/drawing/2010/main" Requires="a14">
           <p:sp>
             <p:nvSpPr>
               <p:cNvPr id="3" name="Content Placeholder 2"/>
@@ -9644,13 +9635,13 @@
             </p:nvSpPr>
             <p:spPr>
               <a:xfrm>
-                <a:off x="2073499" y="2133600"/>
-                <a:ext cx="9431113" cy="4408868"/>
+                <a:off x="2069206" y="1770845"/>
+                <a:ext cx="10122794" cy="5087155"/>
               </a:xfrm>
             </p:spPr>
             <p:txBody>
               <a:bodyPr>
-                <a:normAutofit fontScale="92500" lnSpcReduction="10000"/>
+                <a:normAutofit/>
               </a:bodyPr>
               <a:lstStyle/>
               <a:p>
@@ -9843,7 +9834,7 @@
             </p:txBody>
           </p:sp>
         </mc:Choice>
-        <mc:Fallback xmlns="">
+        <mc:Fallback>
           <p:sp>
             <p:nvSpPr>
               <p:cNvPr id="3" name="Content Placeholder 2"/>
@@ -9856,13 +9847,13 @@
             </p:nvSpPr>
             <p:spPr>
               <a:xfrm>
-                <a:off x="2073499" y="2133600"/>
-                <a:ext cx="9431113" cy="4408868"/>
+                <a:off x="2069206" y="1770845"/>
+                <a:ext cx="10122794" cy="5087155"/>
               </a:xfrm>
               <a:blipFill rotWithShape="0">
                 <a:blip r:embed="rId2"/>
                 <a:stretch>
-                  <a:fillRect l="-840" t="-1798"/>
+                  <a:fillRect l="-903" t="-958" r="-421"/>
                 </a:stretch>
               </a:blipFill>
             </p:spPr>
@@ -11079,7 +11070,6 @@
               <a:rPr lang="en-US" sz="2800" dirty="0" smtClean="0"/>
               <a:t>Experiments:</a:t>
             </a:r>
-            <a:endParaRPr lang="en-US" sz="2800" dirty="0" smtClean="0"/>
           </a:p>
           <a:p>
             <a:pPr lvl="1"/>
@@ -11949,11 +11939,7 @@
           <a:p>
             <a:r>
               <a:rPr lang="en-US" sz="2800" dirty="0" smtClean="0"/>
-              <a:t>UNSAT </a:t>
-            </a:r>
-            <a:r>
-              <a:rPr lang="en-US" sz="2800" dirty="0" smtClean="0"/>
-              <a:t>core prevents some </a:t>
+              <a:t>UNSAT core prevents some </a:t>
             </a:r>
             <a:r>
               <a:rPr lang="en-US" sz="2800" dirty="0" err="1" smtClean="0"/>
@@ -11975,11 +11961,7 @@
             <a:pPr lvl="1"/>
             <a:r>
               <a:rPr lang="en-US" sz="2800" dirty="0" smtClean="0"/>
-              <a:t>Sub-polynomial</a:t>
-            </a:r>
-            <a:r>
-              <a:rPr lang="en-US" sz="2800" dirty="0" smtClean="0"/>
-              <a:t>: </a:t>
+              <a:t>Sub-polynomial: </a:t>
             </a:r>
             <a:r>
               <a:rPr lang="en-US" sz="2800" dirty="0"/>
@@ -12023,7 +12005,6 @@
               <a:rPr lang="en-US" sz="2600" dirty="0" smtClean="0"/>
               <a:t>Future: UNSAT core with infinity bounds.</a:t>
             </a:r>
-            <a:endParaRPr lang="en-US" sz="2600" dirty="0" smtClean="0"/>
           </a:p>
         </p:txBody>
       </p:sp>
@@ -12413,13 +12394,8 @@
             </a:pPr>
             <a:r>
               <a:rPr lang="en-US" sz="2800" dirty="0" smtClean="0"/>
-              <a:t>Limit test cases to a fixed </a:t>
-            </a:r>
-            <a:r>
-              <a:rPr lang="en-US" sz="2800" dirty="0" smtClean="0"/>
-              <a:t>number.</a:t>
-            </a:r>
-            <a:endParaRPr lang="en-US" sz="2800" dirty="0" smtClean="0"/>
+              <a:t>Limit test cases to a fixed number.</a:t>
+            </a:r>
           </a:p>
           <a:p>
             <a:pPr lvl="1"/>
@@ -12431,18 +12407,10 @@
           <a:p>
             <a:pPr lvl="1"/>
             <a:r>
-              <a:rPr lang="en-US" sz="2800" dirty="0" smtClean="0">
-                <a:solidFill>
-                  <a:schemeClr val="tx1"/>
-                </a:solidFill>
-              </a:rPr>
+              <a:rPr lang="en-US" sz="2800" dirty="0" smtClean="0"/>
               <a:t>Other variables: 1 test case.</a:t>
             </a:r>
-            <a:endParaRPr lang="en-US" sz="2800" dirty="0">
-              <a:solidFill>
-                <a:schemeClr val="tx1"/>
-              </a:solidFill>
-            </a:endParaRPr>
+            <a:endParaRPr lang="en-US" sz="2800" dirty="0"/>
           </a:p>
         </p:txBody>
       </p:sp>
@@ -12799,29 +12767,69 @@
             <a:pPr lvl="1"/>
             <a:r>
               <a:rPr lang="en-US" sz="2600" dirty="0" smtClean="0"/>
-              <a:t>m: the number of variables to generate 2 test cases.</a:t>
-            </a:r>
+              <a:t>m: the number of variables to generate 2 test </a:t>
+            </a:r>
+            <a:r>
+              <a:rPr lang="en-US" sz="2600" smtClean="0"/>
+              <a:t>cases</a:t>
+            </a:r>
+            <a:r>
+              <a:rPr lang="en-US" sz="2600" smtClean="0"/>
+              <a:t>.</a:t>
+            </a:r>
+            <a:endParaRPr lang="en-US" sz="2600" dirty="0" smtClean="0"/>
           </a:p>
           <a:p>
             <a:pPr lvl="1"/>
             <a:r>
-              <a:rPr lang="en-US" sz="2400" dirty="0" smtClean="0"/>
-              <a:t>m=10:</a:t>
-            </a:r>
+              <a:rPr lang="en-US" sz="2600" dirty="0" smtClean="0"/>
+              <a:t>m=10</a:t>
+            </a:r>
+            <a:r>
+              <a:rPr lang="en-US" sz="2600" dirty="0"/>
+              <a:t>: 43 problems in </a:t>
+            </a:r>
+            <a:r>
+              <a:rPr lang="en-US" sz="2600" dirty="0" err="1"/>
+              <a:t>Zankl</a:t>
+            </a:r>
+            <a:r>
+              <a:rPr lang="en-US" sz="2600" dirty="0"/>
+              <a:t> solved</a:t>
+            </a:r>
+            <a:r>
+              <a:rPr lang="en-US" sz="2600" dirty="0" smtClean="0"/>
+              <a:t>.</a:t>
+            </a:r>
+            <a:endParaRPr lang="en-US" sz="2600" dirty="0" smtClean="0"/>
           </a:p>
           <a:p>
             <a:pPr lvl="1"/>
             <a:r>
-              <a:rPr lang="en-US" sz="2400" dirty="0" smtClean="0"/>
-              <a:t>m=15:</a:t>
-            </a:r>
+              <a:rPr lang="en-US" sz="2600" dirty="0" smtClean="0"/>
+              <a:t>m=15</a:t>
+            </a:r>
+            <a:r>
+              <a:rPr lang="en-US" sz="2600" dirty="0"/>
+              <a:t>: 44 problems</a:t>
+            </a:r>
+            <a:r>
+              <a:rPr lang="en-US" sz="2600" dirty="0" smtClean="0"/>
+              <a:t>.</a:t>
+            </a:r>
+            <a:endParaRPr lang="en-US" sz="2600" dirty="0" smtClean="0"/>
           </a:p>
           <a:p>
             <a:pPr lvl="1"/>
             <a:r>
-              <a:rPr lang="en-US" sz="2400" dirty="0" smtClean="0"/>
-              <a:t>m=20:</a:t>
-            </a:r>
+              <a:rPr lang="en-US" sz="2600" dirty="0" smtClean="0"/>
+              <a:t>m=20</a:t>
+            </a:r>
+            <a:r>
+              <a:rPr lang="en-US" sz="2600" dirty="0"/>
+              <a:t>: 46 problems.</a:t>
+            </a:r>
+            <a:endParaRPr lang="en-US" sz="2600" dirty="0" smtClean="0"/>
           </a:p>
           <a:p>
             <a:r>
@@ -12851,14 +12859,14 @@
       </p:sp>
       <p:sp>
         <p:nvSpPr>
-          <p:cNvPr id="4" name="TextBox 3"/>
+          <p:cNvPr id="6" name="TextBox 5"/>
           <p:cNvSpPr txBox="1"/>
           <p:nvPr/>
         </p:nvSpPr>
         <p:spPr>
           <a:xfrm>
-            <a:off x="3759838" y="3921015"/>
-            <a:ext cx="4307589" cy="461665"/>
+            <a:off x="3759838" y="4838479"/>
+            <a:ext cx="184731" cy="830997"/>
           </a:xfrm>
           <a:prstGeom prst="rect">
             <a:avLst/>
@@ -12871,76 +12879,10 @@
           </a:bodyPr>
           <a:lstStyle/>
           <a:p>
-            <a:r>
-              <a:rPr lang="en-US" sz="2400" dirty="0"/>
-              <a:t>43 problems in </a:t>
-            </a:r>
-            <a:r>
-              <a:rPr lang="en-US" sz="2400" dirty="0" err="1"/>
-              <a:t>Zankl</a:t>
-            </a:r>
-            <a:r>
-              <a:rPr lang="en-US" sz="2400" dirty="0"/>
-              <a:t> solved.</a:t>
-            </a:r>
-          </a:p>
-        </p:txBody>
-      </p:sp>
-      <p:sp>
-        <p:nvSpPr>
-          <p:cNvPr id="5" name="TextBox 4"/>
-          <p:cNvSpPr txBox="1"/>
-          <p:nvPr/>
-        </p:nvSpPr>
-        <p:spPr>
-          <a:xfrm>
-            <a:off x="3759838" y="4376814"/>
-            <a:ext cx="2079415" cy="461665"/>
-          </a:xfrm>
-          <a:prstGeom prst="rect">
-            <a:avLst/>
-          </a:prstGeom>
-          <a:noFill/>
-        </p:spPr>
-        <p:txBody>
-          <a:bodyPr wrap="none" rtlCol="0">
-            <a:spAutoFit/>
-          </a:bodyPr>
-          <a:lstStyle/>
-          <a:p>
-            <a:r>
-              <a:rPr lang="en-US" sz="2400" dirty="0"/>
-              <a:t>44 problems.</a:t>
-            </a:r>
-          </a:p>
-        </p:txBody>
-      </p:sp>
-      <p:sp>
-        <p:nvSpPr>
-          <p:cNvPr id="6" name="TextBox 5"/>
-          <p:cNvSpPr txBox="1"/>
-          <p:nvPr/>
-        </p:nvSpPr>
-        <p:spPr>
-          <a:xfrm>
-            <a:off x="3759838" y="4838479"/>
-            <a:ext cx="2079415" cy="461665"/>
-          </a:xfrm>
-          <a:prstGeom prst="rect">
-            <a:avLst/>
-          </a:prstGeom>
-          <a:noFill/>
-        </p:spPr>
-        <p:txBody>
-          <a:bodyPr wrap="none" rtlCol="0">
-            <a:spAutoFit/>
-          </a:bodyPr>
-          <a:lstStyle/>
-          <a:p>
-            <a:r>
-              <a:rPr lang="en-US" sz="2400" dirty="0"/>
-              <a:t>46 problems.</a:t>
-            </a:r>
+            <a:endParaRPr lang="en-US" sz="2400" dirty="0" smtClean="0"/>
+          </a:p>
+          <a:p>
+            <a:endParaRPr lang="en-US" sz="2400" dirty="0"/>
           </a:p>
         </p:txBody>
       </p:sp>
@@ -13580,10 +13522,15 @@
                             </p:stCondLst>
                             <p:childTnLst>
                               <p:par>
-                                <p:cTn id="37" presetID="2" presetClass="entr" presetSubtype="4" fill="hold" grpId="0" nodeType="clickEffect">
+                                <p:cTn id="37" presetID="2" presetClass="entr" presetSubtype="4" fill="hold" grpId="0" nodeType="clickEffect" nodePh="1">
                                   <p:stCondLst>
                                     <p:cond delay="0"/>
                                   </p:stCondLst>
+                                  <p:endCondLst>
+                                    <p:cond evt="begin" delay="0">
+                                      <p:tn val="37"/>
+                                    </p:cond>
+                                  </p:endCondLst>
                                   <p:childTnLst>
                                     <p:set>
                                       <p:cBhvr>
@@ -13631,152 +13578,6 @@
                                         <p:cTn id="40" dur="500" fill="hold"/>
                                         <p:tgtEl>
                                           <p:spTgt spid="6"/>
-                                        </p:tgtEl>
-                                        <p:attrNameLst>
-                                          <p:attrName>ppt_y</p:attrName>
-                                        </p:attrNameLst>
-                                      </p:cBhvr>
-                                      <p:tavLst>
-                                        <p:tav tm="0">
-                                          <p:val>
-                                            <p:strVal val="1+#ppt_h/2"/>
-                                          </p:val>
-                                        </p:tav>
-                                        <p:tav tm="100000">
-                                          <p:val>
-                                            <p:strVal val="#ppt_y"/>
-                                          </p:val>
-                                        </p:tav>
-                                      </p:tavLst>
-                                    </p:anim>
-                                  </p:childTnLst>
-                                </p:cTn>
-                              </p:par>
-                              <p:par>
-                                <p:cTn id="41" presetID="2" presetClass="entr" presetSubtype="4" fill="hold" grpId="0" nodeType="withEffect">
-                                  <p:stCondLst>
-                                    <p:cond delay="0"/>
-                                  </p:stCondLst>
-                                  <p:childTnLst>
-                                    <p:set>
-                                      <p:cBhvr>
-                                        <p:cTn id="42" dur="1" fill="hold">
-                                          <p:stCondLst>
-                                            <p:cond delay="0"/>
-                                          </p:stCondLst>
-                                        </p:cTn>
-                                        <p:tgtEl>
-                                          <p:spTgt spid="5"/>
-                                        </p:tgtEl>
-                                        <p:attrNameLst>
-                                          <p:attrName>style.visibility</p:attrName>
-                                        </p:attrNameLst>
-                                      </p:cBhvr>
-                                      <p:to>
-                                        <p:strVal val="visible"/>
-                                      </p:to>
-                                    </p:set>
-                                    <p:anim calcmode="lin" valueType="num">
-                                      <p:cBhvr additive="base">
-                                        <p:cTn id="43" dur="500" fill="hold"/>
-                                        <p:tgtEl>
-                                          <p:spTgt spid="5"/>
-                                        </p:tgtEl>
-                                        <p:attrNameLst>
-                                          <p:attrName>ppt_x</p:attrName>
-                                        </p:attrNameLst>
-                                      </p:cBhvr>
-                                      <p:tavLst>
-                                        <p:tav tm="0">
-                                          <p:val>
-                                            <p:strVal val="#ppt_x"/>
-                                          </p:val>
-                                        </p:tav>
-                                        <p:tav tm="100000">
-                                          <p:val>
-                                            <p:strVal val="#ppt_x"/>
-                                          </p:val>
-                                        </p:tav>
-                                      </p:tavLst>
-                                    </p:anim>
-                                    <p:anim calcmode="lin" valueType="num">
-                                      <p:cBhvr additive="base">
-                                        <p:cTn id="44" dur="500" fill="hold"/>
-                                        <p:tgtEl>
-                                          <p:spTgt spid="5"/>
-                                        </p:tgtEl>
-                                        <p:attrNameLst>
-                                          <p:attrName>ppt_y</p:attrName>
-                                        </p:attrNameLst>
-                                      </p:cBhvr>
-                                      <p:tavLst>
-                                        <p:tav tm="0">
-                                          <p:val>
-                                            <p:strVal val="1+#ppt_h/2"/>
-                                          </p:val>
-                                        </p:tav>
-                                        <p:tav tm="100000">
-                                          <p:val>
-                                            <p:strVal val="#ppt_y"/>
-                                          </p:val>
-                                        </p:tav>
-                                      </p:tavLst>
-                                    </p:anim>
-                                  </p:childTnLst>
-                                </p:cTn>
-                              </p:par>
-                              <p:par>
-                                <p:cTn id="45" presetID="2" presetClass="entr" presetSubtype="4" fill="hold" grpId="0" nodeType="withEffect">
-                                  <p:stCondLst>
-                                    <p:cond delay="0"/>
-                                  </p:stCondLst>
-                                  <p:childTnLst>
-                                    <p:set>
-                                      <p:cBhvr>
-                                        <p:cTn id="46" dur="1" fill="hold">
-                                          <p:stCondLst>
-                                            <p:cond delay="0"/>
-                                          </p:stCondLst>
-                                        </p:cTn>
-                                        <p:tgtEl>
-                                          <p:spTgt spid="4"/>
-                                        </p:tgtEl>
-                                        <p:attrNameLst>
-                                          <p:attrName>style.visibility</p:attrName>
-                                        </p:attrNameLst>
-                                      </p:cBhvr>
-                                      <p:to>
-                                        <p:strVal val="visible"/>
-                                      </p:to>
-                                    </p:set>
-                                    <p:anim calcmode="lin" valueType="num">
-                                      <p:cBhvr additive="base">
-                                        <p:cTn id="47" dur="500" fill="hold"/>
-                                        <p:tgtEl>
-                                          <p:spTgt spid="4"/>
-                                        </p:tgtEl>
-                                        <p:attrNameLst>
-                                          <p:attrName>ppt_x</p:attrName>
-                                        </p:attrNameLst>
-                                      </p:cBhvr>
-                                      <p:tavLst>
-                                        <p:tav tm="0">
-                                          <p:val>
-                                            <p:strVal val="#ppt_x"/>
-                                          </p:val>
-                                        </p:tav>
-                                        <p:tav tm="100000">
-                                          <p:val>
-                                            <p:strVal val="#ppt_x"/>
-                                          </p:val>
-                                        </p:tav>
-                                      </p:tavLst>
-                                    </p:anim>
-                                    <p:anim calcmode="lin" valueType="num">
-                                      <p:cBhvr additive="base">
-                                        <p:cTn id="48" dur="500" fill="hold"/>
-                                        <p:tgtEl>
-                                          <p:spTgt spid="4"/>
                                         </p:tgtEl>
                                         <p:attrNameLst>
                                           <p:attrName>ppt_y</p:attrName>
@@ -13805,26 +13606,26 @@
                     </p:cTn>
                   </p:par>
                   <p:par>
-                    <p:cTn id="49" fill="hold">
+                    <p:cTn id="41" fill="hold">
                       <p:stCondLst>
                         <p:cond delay="indefinite"/>
                       </p:stCondLst>
                       <p:childTnLst>
                         <p:par>
-                          <p:cTn id="50" fill="hold">
+                          <p:cTn id="42" fill="hold">
                             <p:stCondLst>
                               <p:cond delay="0"/>
                             </p:stCondLst>
                             <p:childTnLst>
                               <p:par>
-                                <p:cTn id="51" presetID="2" presetClass="entr" presetSubtype="4" fill="hold" nodeType="clickEffect">
+                                <p:cTn id="43" presetID="2" presetClass="entr" presetSubtype="4" fill="hold" nodeType="clickEffect">
                                   <p:stCondLst>
                                     <p:cond delay="0"/>
                                   </p:stCondLst>
                                   <p:childTnLst>
                                     <p:set>
                                       <p:cBhvr>
-                                        <p:cTn id="52" dur="1" fill="hold">
+                                        <p:cTn id="44" dur="1" fill="hold">
                                           <p:stCondLst>
                                             <p:cond delay="0"/>
                                           </p:stCondLst>
@@ -13846,7 +13647,7 @@
                                     </p:set>
                                     <p:anim calcmode="lin" valueType="num">
                                       <p:cBhvr additive="base">
-                                        <p:cTn id="53" dur="500" fill="hold"/>
+                                        <p:cTn id="45" dur="500" fill="hold"/>
                                         <p:tgtEl>
                                           <p:spTgt spid="3">
                                             <p:txEl>
@@ -13873,7 +13674,7 @@
                                     </p:anim>
                                     <p:anim calcmode="lin" valueType="num">
                                       <p:cBhvr additive="base">
-                                        <p:cTn id="54" dur="500" fill="hold"/>
+                                        <p:cTn id="46" dur="500" fill="hold"/>
                                         <p:tgtEl>
                                           <p:spTgt spid="3">
                                             <p:txEl>
@@ -13908,26 +13709,26 @@
                     </p:cTn>
                   </p:par>
                   <p:par>
-                    <p:cTn id="55" fill="hold">
+                    <p:cTn id="47" fill="hold">
                       <p:stCondLst>
                         <p:cond delay="indefinite"/>
                       </p:stCondLst>
                       <p:childTnLst>
                         <p:par>
-                          <p:cTn id="56" fill="hold">
+                          <p:cTn id="48" fill="hold">
                             <p:stCondLst>
                               <p:cond delay="0"/>
                             </p:stCondLst>
                             <p:childTnLst>
                               <p:par>
-                                <p:cTn id="57" presetID="2" presetClass="entr" presetSubtype="4" fill="hold" nodeType="clickEffect">
+                                <p:cTn id="49" presetID="2" presetClass="entr" presetSubtype="4" fill="hold" nodeType="clickEffect">
                                   <p:stCondLst>
                                     <p:cond delay="0"/>
                                   </p:stCondLst>
                                   <p:childTnLst>
                                     <p:set>
                                       <p:cBhvr>
-                                        <p:cTn id="58" dur="1" fill="hold">
+                                        <p:cTn id="50" dur="1" fill="hold">
                                           <p:stCondLst>
                                             <p:cond delay="0"/>
                                           </p:stCondLst>
@@ -13949,7 +13750,7 @@
                                     </p:set>
                                     <p:anim calcmode="lin" valueType="num">
                                       <p:cBhvr additive="base">
-                                        <p:cTn id="59" dur="500" fill="hold"/>
+                                        <p:cTn id="51" dur="500" fill="hold"/>
                                         <p:tgtEl>
                                           <p:spTgt spid="3">
                                             <p:txEl>
@@ -13976,7 +13777,7 @@
                                     </p:anim>
                                     <p:anim calcmode="lin" valueType="num">
                                       <p:cBhvr additive="base">
-                                        <p:cTn id="60" dur="500" fill="hold"/>
+                                        <p:cTn id="52" dur="500" fill="hold"/>
                                         <p:tgtEl>
                                           <p:spTgt spid="3">
                                             <p:txEl>
@@ -14032,8 +13833,6 @@
       </p:par>
     </p:tnLst>
     <p:bldLst>
-      <p:bldP spid="4" grpId="0"/>
-      <p:bldP spid="5" grpId="0"/>
       <p:bldP spid="6" grpId="0"/>
     </p:bldLst>
   </p:timing>
@@ -15560,19 +15359,7 @@
               <a:p>
                 <a:r>
                   <a:rPr lang="en-US" sz="2600" dirty="0" smtClean="0"/>
-                  <a:t>Currently, we evaluate intervals by IA, choosing the interval with longer </a:t>
-                </a:r>
-                <a:r>
-                  <a:rPr lang="en-US" sz="2600" dirty="0" smtClean="0"/>
-                  <a:t>SAT </a:t>
-                </a:r>
-                <a:r>
-                  <a:rPr lang="en-US" sz="2600" dirty="0" smtClean="0"/>
-                  <a:t>length</a:t>
-                </a:r>
-                <a:r>
-                  <a:rPr lang="en-US" sz="2600" dirty="0" smtClean="0"/>
-                  <a:t>.</a:t>
+                  <a:t>Currently, we evaluate intervals by IA, choosing the interval with longer SAT length.</a:t>
                 </a:r>
               </a:p>
               <a:p>
@@ -15586,7 +15373,19 @@
               <a:p>
                 <a:r>
                   <a:rPr lang="en-US" sz="2800" dirty="0" smtClean="0"/>
-                  <a:t>Experiments with threshold = 0.1 for intervals: </a:t>
+                  <a:t>Experiments </a:t>
+                </a:r>
+                <a:r>
+                  <a:rPr lang="en-US" sz="2800" dirty="0" smtClean="0">
+                    <a:solidFill>
+                      <a:srgbClr val="FF0000"/>
+                    </a:solidFill>
+                  </a:rPr>
+                  <a:t>with threshold = 0.1</a:t>
+                </a:r>
+                <a:r>
+                  <a:rPr lang="en-US" sz="2800" dirty="0" smtClean="0"/>
+                  <a:t> for intervals: </a:t>
                 </a:r>
               </a:p>
               <a:p>
@@ -18074,11 +17873,7 @@
           <a:p>
             <a:r>
               <a:rPr lang="en-US" sz="2800" dirty="0" smtClean="0"/>
-              <a:t>Intermediate </a:t>
-            </a:r>
-            <a:r>
-              <a:rPr lang="en-US" sz="2800" dirty="0" smtClean="0"/>
-              <a:t>value theorem: restrictions.</a:t>
+              <a:t>Intermediate value theorem: restrictions.</a:t>
             </a:r>
           </a:p>
           <a:p>
@@ -18322,8 +18117,8 @@
           </a:p>
         </p:txBody>
       </p:sp>
-      <mc:AlternateContent xmlns:mc="http://schemas.openxmlformats.org/markup-compatibility/2006">
-        <mc:Choice xmlns:a14="http://schemas.microsoft.com/office/drawing/2010/main" Requires="a14">
+      <mc:AlternateContent xmlns:mc="http://schemas.openxmlformats.org/markup-compatibility/2006" xmlns:a14="http://schemas.microsoft.com/office/drawing/2010/main">
+        <mc:Choice Requires="a14">
           <p:sp>
             <p:nvSpPr>
               <p:cNvPr id="3" name="Content Placeholder 2"/>
@@ -18655,7 +18450,7 @@
             </p:txBody>
           </p:sp>
         </mc:Choice>
-        <mc:Fallback>
+        <mc:Fallback xmlns="">
           <p:sp>
             <p:nvSpPr>
               <p:cNvPr id="3" name="Content Placeholder 2"/>
@@ -21333,13 +21128,8 @@
             <a:pPr lvl="1"/>
             <a:r>
               <a:rPr lang="en-US" sz="2600" dirty="0" smtClean="0"/>
-              <a:t>Abstraction </a:t>
-            </a:r>
-            <a:r>
-              <a:rPr lang="en-US" sz="2600" dirty="0" smtClean="0"/>
-              <a:t>refinement.</a:t>
-            </a:r>
-            <a:endParaRPr lang="en-US" sz="2600" dirty="0" smtClean="0"/>
+              <a:t>Abstraction refinement.</a:t>
+            </a:r>
           </a:p>
           <a:p>
             <a:pPr lvl="1"/>
@@ -22828,8 +22618,8 @@
           </a:p>
         </p:txBody>
       </p:sp>
-      <mc:AlternateContent xmlns:mc="http://schemas.openxmlformats.org/markup-compatibility/2006">
-        <mc:Choice xmlns:a14="http://schemas.microsoft.com/office/drawing/2010/main" Requires="a14">
+      <mc:AlternateContent xmlns:mc="http://schemas.openxmlformats.org/markup-compatibility/2006" xmlns:a14="http://schemas.microsoft.com/office/drawing/2010/main">
+        <mc:Choice Requires="a14">
           <p:sp>
             <p:nvSpPr>
               <p:cNvPr id="3" name="Content Placeholder 2"/>
@@ -23460,7 +23250,7 @@
             </p:txBody>
           </p:sp>
         </mc:Choice>
-        <mc:Fallback>
+        <mc:Fallback xmlns="">
           <p:sp>
             <p:nvSpPr>
               <p:cNvPr id="3" name="Content Placeholder 2"/>
@@ -26510,8 +26300,8 @@
           </a:p>
         </p:txBody>
       </p:sp>
-      <mc:AlternateContent xmlns:mc="http://schemas.openxmlformats.org/markup-compatibility/2006">
-        <mc:Choice xmlns:a14="http://schemas.microsoft.com/office/drawing/2010/main" Requires="a14">
+      <mc:AlternateContent xmlns:mc="http://schemas.openxmlformats.org/markup-compatibility/2006" xmlns:a14="http://schemas.microsoft.com/office/drawing/2010/main">
+        <mc:Choice Requires="a14">
           <p:sp>
             <p:nvSpPr>
               <p:cNvPr id="3" name="Content Placeholder 2"/>
@@ -26578,15 +26368,7 @@
                 <a:pPr lvl="1"/>
                 <a:r>
                   <a:rPr lang="en-US" sz="2400" dirty="0" smtClean="0"/>
-                  <a:t>Interval constraint propagation: ISAT uses interval arithmetic only, </a:t>
-                </a:r>
-                <a:r>
-                  <a:rPr lang="en-US" sz="2400" dirty="0" smtClean="0"/>
-                  <a:t>ability of solving </a:t>
-                </a:r>
-                <a:r>
-                  <a:rPr lang="en-US" sz="2400" dirty="0" smtClean="0"/>
-                  <a:t>SAT problem is limited.</a:t>
+                  <a:t>Interval constraint propagation: ISAT uses interval arithmetic only, ability of solving SAT problem is limited.</a:t>
                 </a:r>
               </a:p>
               <a:p>
@@ -26645,7 +26427,7 @@
             </p:txBody>
           </p:sp>
         </mc:Choice>
-        <mc:Fallback>
+        <mc:Fallback xmlns="">
           <p:sp>
             <p:nvSpPr>
               <p:cNvPr id="3" name="Content Placeholder 2"/>
@@ -27075,8 +26857,8 @@
           </a:p>
         </p:txBody>
       </p:sp>
-      <mc:AlternateContent xmlns:mc="http://schemas.openxmlformats.org/markup-compatibility/2006">
-        <mc:Choice xmlns:a14="http://schemas.microsoft.com/office/drawing/2010/main" Requires="a14">
+      <mc:AlternateContent xmlns:mc="http://schemas.openxmlformats.org/markup-compatibility/2006" xmlns:a14="http://schemas.microsoft.com/office/drawing/2010/main">
+        <mc:Choice Requires="a14">
           <p:sp>
             <p:nvSpPr>
               <p:cNvPr id="3" name="Content Placeholder 2"/>
@@ -27110,11 +26892,7 @@
                 </a:pPr>
                 <a:r>
                   <a:rPr lang="en-US" sz="2800" dirty="0" smtClean="0"/>
-                  <a:t>SMT solver (initially) for solving polynomial </a:t>
-                </a:r>
-                <a:r>
-                  <a:rPr lang="en-US" sz="2800" dirty="0" smtClean="0"/>
-                  <a:t>strict </a:t>
+                  <a:t>SMT solver (initially) for solving polynomial strict </a:t>
                 </a:r>
                 <a:r>
                   <a:rPr lang="en-US" sz="2800" dirty="0" smtClean="0">
@@ -27416,7 +27194,7 @@
             </p:txBody>
           </p:sp>
         </mc:Choice>
-        <mc:Fallback>
+        <mc:Fallback xmlns="">
           <p:sp>
             <p:nvSpPr>
               <p:cNvPr id="3" name="Content Placeholder 2"/>

</xml_diff>